<commit_message>
some plotting for exploratory analyses + re-organization
</commit_message>
<xml_diff>
--- a/docs/storyboard.pptx
+++ b/docs/storyboard.pptx
@@ -5,7 +5,7 @@
     <p:sldMasterId id="2147483648" r:id="rId1"/>
   </p:sldMasterIdLst>
   <p:notesMasterIdLst>
-    <p:notesMasterId r:id="rId11"/>
+    <p:notesMasterId r:id="rId18"/>
   </p:notesMasterIdLst>
   <p:sldIdLst>
     <p:sldId id="256" r:id="rId2"/>
@@ -14,9 +14,16 @@
     <p:sldId id="257" r:id="rId5"/>
     <p:sldId id="263" r:id="rId6"/>
     <p:sldId id="260" r:id="rId7"/>
-    <p:sldId id="262" r:id="rId8"/>
-    <p:sldId id="258" r:id="rId9"/>
-    <p:sldId id="264" r:id="rId10"/>
+    <p:sldId id="265" r:id="rId8"/>
+    <p:sldId id="268" r:id="rId9"/>
+    <p:sldId id="266" r:id="rId10"/>
+    <p:sldId id="267" r:id="rId11"/>
+    <p:sldId id="271" r:id="rId12"/>
+    <p:sldId id="269" r:id="rId13"/>
+    <p:sldId id="270" r:id="rId14"/>
+    <p:sldId id="262" r:id="rId15"/>
+    <p:sldId id="258" r:id="rId16"/>
+    <p:sldId id="264" r:id="rId17"/>
   </p:sldIdLst>
   <p:sldSz cx="12192000" cy="6858000"/>
   <p:notesSz cx="6858000" cy="9144000"/>
@@ -115,6 +122,11 @@
       </a:defRPr>
     </a:lvl9pPr>
   </p:defaultTextStyle>
+  <p:extLst>
+    <p:ext uri="{EFAFB233-063F-42B5-8137-9DF3F51BA10A}">
+      <p15:sldGuideLst xmlns:p15="http://schemas.microsoft.com/office/powerpoint/2012/main"/>
+    </p:ext>
+  </p:extLst>
 </p:presentation>
 </file>
 
@@ -200,7 +212,7 @@
           <a:p>
             <a:fld id="{05D2B1B1-D9EE-9441-950D-C823E2B17417}" type="datetimeFigureOut">
               <a:rPr lang="en-US" smtClean="0"/>
-              <a:t>10/8/25</a:t>
+              <a:t>10/29/25</a:t>
             </a:fld>
             <a:endParaRPr lang="en-US"/>
           </a:p>
@@ -535,7 +547,7 @@
           <a:p>
             <a:fld id="{6CDFCB3D-35C4-C549-B975-3D4C63AE4352}" type="slidenum">
               <a:rPr lang="en-US" smtClean="0"/>
-              <a:t>7</a:t>
+              <a:t>14</a:t>
             </a:fld>
             <a:endParaRPr lang="en-US"/>
           </a:p>
@@ -701,7 +713,7 @@
           <a:p>
             <a:fld id="{1C65382B-6889-7E41-A78D-4A065A4CE39D}" type="datetimeFigureOut">
               <a:rPr lang="en-US" smtClean="0"/>
-              <a:t>10/8/25</a:t>
+              <a:t>10/29/25</a:t>
             </a:fld>
             <a:endParaRPr lang="en-US"/>
           </a:p>
@@ -899,7 +911,7 @@
           <a:p>
             <a:fld id="{1C65382B-6889-7E41-A78D-4A065A4CE39D}" type="datetimeFigureOut">
               <a:rPr lang="en-US" smtClean="0"/>
-              <a:t>10/8/25</a:t>
+              <a:t>10/29/25</a:t>
             </a:fld>
             <a:endParaRPr lang="en-US"/>
           </a:p>
@@ -1107,7 +1119,7 @@
           <a:p>
             <a:fld id="{1C65382B-6889-7E41-A78D-4A065A4CE39D}" type="datetimeFigureOut">
               <a:rPr lang="en-US" smtClean="0"/>
-              <a:t>10/8/25</a:t>
+              <a:t>10/29/25</a:t>
             </a:fld>
             <a:endParaRPr lang="en-US"/>
           </a:p>
@@ -1305,7 +1317,7 @@
           <a:p>
             <a:fld id="{1C65382B-6889-7E41-A78D-4A065A4CE39D}" type="datetimeFigureOut">
               <a:rPr lang="en-US" smtClean="0"/>
-              <a:t>10/8/25</a:t>
+              <a:t>10/29/25</a:t>
             </a:fld>
             <a:endParaRPr lang="en-US"/>
           </a:p>
@@ -1580,7 +1592,7 @@
           <a:p>
             <a:fld id="{1C65382B-6889-7E41-A78D-4A065A4CE39D}" type="datetimeFigureOut">
               <a:rPr lang="en-US" smtClean="0"/>
-              <a:t>10/8/25</a:t>
+              <a:t>10/29/25</a:t>
             </a:fld>
             <a:endParaRPr lang="en-US"/>
           </a:p>
@@ -1845,7 +1857,7 @@
           <a:p>
             <a:fld id="{1C65382B-6889-7E41-A78D-4A065A4CE39D}" type="datetimeFigureOut">
               <a:rPr lang="en-US" smtClean="0"/>
-              <a:t>10/8/25</a:t>
+              <a:t>10/29/25</a:t>
             </a:fld>
             <a:endParaRPr lang="en-US"/>
           </a:p>
@@ -2257,7 +2269,7 @@
           <a:p>
             <a:fld id="{1C65382B-6889-7E41-A78D-4A065A4CE39D}" type="datetimeFigureOut">
               <a:rPr lang="en-US" smtClean="0"/>
-              <a:t>10/8/25</a:t>
+              <a:t>10/29/25</a:t>
             </a:fld>
             <a:endParaRPr lang="en-US"/>
           </a:p>
@@ -2398,7 +2410,7 @@
           <a:p>
             <a:fld id="{1C65382B-6889-7E41-A78D-4A065A4CE39D}" type="datetimeFigureOut">
               <a:rPr lang="en-US" smtClean="0"/>
-              <a:t>10/8/25</a:t>
+              <a:t>10/29/25</a:t>
             </a:fld>
             <a:endParaRPr lang="en-US"/>
           </a:p>
@@ -2511,7 +2523,7 @@
           <a:p>
             <a:fld id="{1C65382B-6889-7E41-A78D-4A065A4CE39D}" type="datetimeFigureOut">
               <a:rPr lang="en-US" smtClean="0"/>
-              <a:t>10/8/25</a:t>
+              <a:t>10/29/25</a:t>
             </a:fld>
             <a:endParaRPr lang="en-US"/>
           </a:p>
@@ -2822,7 +2834,7 @@
           <a:p>
             <a:fld id="{1C65382B-6889-7E41-A78D-4A065A4CE39D}" type="datetimeFigureOut">
               <a:rPr lang="en-US" smtClean="0"/>
-              <a:t>10/8/25</a:t>
+              <a:t>10/29/25</a:t>
             </a:fld>
             <a:endParaRPr lang="en-US"/>
           </a:p>
@@ -3110,7 +3122,7 @@
           <a:p>
             <a:fld id="{1C65382B-6889-7E41-A78D-4A065A4CE39D}" type="datetimeFigureOut">
               <a:rPr lang="en-US" smtClean="0"/>
-              <a:t>10/8/25</a:t>
+              <a:t>10/29/25</a:t>
             </a:fld>
             <a:endParaRPr lang="en-US"/>
           </a:p>
@@ -3351,7 +3363,7 @@
           <a:p>
             <a:fld id="{1C65382B-6889-7E41-A78D-4A065A4CE39D}" type="datetimeFigureOut">
               <a:rPr lang="en-US" smtClean="0"/>
-              <a:t>10/8/25</a:t>
+              <a:t>10/29/25</a:t>
             </a:fld>
             <a:endParaRPr lang="en-US"/>
           </a:p>
@@ -3834,7 +3846,7 @@
 </p:sld>
 </file>
 
-<file path=ppt/slides/slide2.xml><?xml version="1.0" encoding="utf-8"?>
+<file path=ppt/slides/slide10.xml><?xml version="1.0" encoding="utf-8"?>
 <p:sld xmlns:a="http://schemas.openxmlformats.org/drawingml/2006/main" xmlns:r="http://schemas.openxmlformats.org/officeDocument/2006/relationships" xmlns:p="http://schemas.openxmlformats.org/presentationml/2006/main">
   <p:cSld>
     <p:spTree>
@@ -3856,7 +3868,7 @@
           <p:cNvPr id="2" name="Title 1">
             <a:extLst>
               <a:ext uri="{FF2B5EF4-FFF2-40B4-BE49-F238E27FC236}">
-                <a16:creationId xmlns:a16="http://schemas.microsoft.com/office/drawing/2014/main" id="{639C8487-A3E6-4774-86D7-C8C731F25A5F}"/>
+                <a16:creationId xmlns:a16="http://schemas.microsoft.com/office/drawing/2014/main" id="{651761CF-3A7D-EC35-FFC4-1FC4B96C55FD}"/>
               </a:ext>
             </a:extLst>
           </p:cNvPr>
@@ -3874,7 +3886,7 @@
           <a:p>
             <a:r>
               <a:rPr lang="en-US" dirty="0"/>
-              <a:t>General overview</a:t>
+              <a:t>possible models</a:t>
             </a:r>
           </a:p>
         </p:txBody>
@@ -3884,7 +3896,7 @@
           <p:cNvPr id="3" name="Content Placeholder 2">
             <a:extLst>
               <a:ext uri="{FF2B5EF4-FFF2-40B4-BE49-F238E27FC236}">
-                <a16:creationId xmlns:a16="http://schemas.microsoft.com/office/drawing/2014/main" id="{F24FE626-61EF-B7A6-196E-46A1E8E5FA79}"/>
+                <a16:creationId xmlns:a16="http://schemas.microsoft.com/office/drawing/2014/main" id="{A82E6B46-BB09-B1FE-7E5F-360D395BED8B}"/>
               </a:ext>
             </a:extLst>
           </p:cNvPr>
@@ -3895,71 +3907,206 @@
             <p:ph idx="1"/>
           </p:nvPr>
         </p:nvSpPr>
-        <p:spPr/>
-        <p:txBody>
-          <a:bodyPr>
-            <a:normAutofit fontScale="85000" lnSpcReduction="10000"/>
+        <p:spPr>
+          <a:xfrm>
+            <a:off x="838200" y="1825625"/>
+            <a:ext cx="10515600" cy="3089275"/>
+          </a:xfrm>
+        </p:spPr>
+        <p:txBody>
+          <a:bodyPr/>
+          <a:lstStyle/>
+          <a:p>
+            <a:pPr marL="0" indent="0">
+              <a:buNone/>
+            </a:pPr>
+            <a:endParaRPr lang="en-US" dirty="0"/>
+          </a:p>
+          <a:p>
+            <a:pPr marL="0" indent="0">
+              <a:buNone/>
+            </a:pPr>
+            <a:r>
+              <a:rPr lang="en-US" dirty="0"/>
+              <a:t>colony number ~ </a:t>
+            </a:r>
+            <a:r>
+              <a:rPr lang="en-US" dirty="0" err="1"/>
+              <a:t>seminat_area</a:t>
+            </a:r>
+            <a:r>
+              <a:rPr lang="en-US" dirty="0"/>
+              <a:t> + </a:t>
+            </a:r>
+            <a:r>
+              <a:rPr lang="en-US" dirty="0" err="1"/>
+              <a:t>iji</a:t>
+            </a:r>
+            <a:r>
+              <a:rPr lang="en-US" dirty="0"/>
+              <a:t> + </a:t>
+            </a:r>
+            <a:r>
+              <a:rPr lang="en-US" dirty="0" err="1"/>
+              <a:t>avg_floral</a:t>
+            </a:r>
+            <a:r>
+              <a:rPr lang="en-US" dirty="0"/>
+              <a:t> + (1| transect)</a:t>
+            </a:r>
+          </a:p>
+          <a:p>
+            <a:pPr marL="0" indent="0">
+              <a:buNone/>
+            </a:pPr>
+            <a:endParaRPr lang="en-US" dirty="0"/>
+          </a:p>
+          <a:p>
+            <a:pPr marL="0" indent="0">
+              <a:buNone/>
+            </a:pPr>
+            <a:r>
+              <a:rPr lang="en-US" dirty="0"/>
+              <a:t>worker number ~ </a:t>
+            </a:r>
+            <a:r>
+              <a:rPr lang="en-US" dirty="0" err="1"/>
+              <a:t>seminat_area</a:t>
+            </a:r>
+            <a:r>
+              <a:rPr lang="en-US" dirty="0"/>
+              <a:t> + </a:t>
+            </a:r>
+            <a:r>
+              <a:rPr lang="en-US" dirty="0" err="1"/>
+              <a:t>iji</a:t>
+            </a:r>
+            <a:r>
+              <a:rPr lang="en-US" dirty="0"/>
+              <a:t> + </a:t>
+            </a:r>
+            <a:r>
+              <a:rPr lang="en-US" dirty="0" err="1"/>
+              <a:t>avg_floral</a:t>
+            </a:r>
+            <a:r>
+              <a:rPr lang="en-US" dirty="0"/>
+              <a:t> + (1| transect)</a:t>
+            </a:r>
+          </a:p>
+          <a:p>
+            <a:pPr marL="0" indent="0">
+              <a:buNone/>
+            </a:pPr>
+            <a:endParaRPr lang="en-US" dirty="0"/>
+          </a:p>
+          <a:p>
+            <a:pPr marL="0" indent="0">
+              <a:buNone/>
+            </a:pPr>
+            <a:r>
+              <a:rPr lang="en-US" dirty="0"/>
+              <a:t># workers / colony ~ </a:t>
+            </a:r>
+            <a:r>
+              <a:rPr lang="en-US" dirty="0" err="1"/>
+              <a:t>seminat_area</a:t>
+            </a:r>
+            <a:r>
+              <a:rPr lang="en-US" dirty="0"/>
+              <a:t> + </a:t>
+            </a:r>
+            <a:r>
+              <a:rPr lang="en-US" dirty="0" err="1"/>
+              <a:t>iji</a:t>
+            </a:r>
+            <a:r>
+              <a:rPr lang="en-US" dirty="0"/>
+              <a:t> + </a:t>
+            </a:r>
+            <a:r>
+              <a:rPr lang="en-US" dirty="0" err="1"/>
+              <a:t>avg_floral</a:t>
+            </a:r>
+            <a:r>
+              <a:rPr lang="en-US" dirty="0"/>
+              <a:t> + (1| transect)</a:t>
+            </a:r>
+          </a:p>
+          <a:p>
+            <a:pPr marL="0" indent="0">
+              <a:buNone/>
+            </a:pPr>
+            <a:endParaRPr lang="en-US" dirty="0"/>
+          </a:p>
+        </p:txBody>
+      </p:sp>
+      <p:sp>
+        <p:nvSpPr>
+          <p:cNvPr id="4" name="TextBox 3">
+            <a:extLst>
+              <a:ext uri="{FF2B5EF4-FFF2-40B4-BE49-F238E27FC236}">
+                <a16:creationId xmlns:a16="http://schemas.microsoft.com/office/drawing/2014/main" id="{9A730963-E301-C9B1-B98B-776A32D7E4B5}"/>
+              </a:ext>
+            </a:extLst>
+          </p:cNvPr>
+          <p:cNvSpPr txBox="1"/>
+          <p:nvPr/>
+        </p:nvSpPr>
+        <p:spPr>
+          <a:xfrm>
+            <a:off x="685800" y="5049837"/>
+            <a:ext cx="3527184" cy="369332"/>
+          </a:xfrm>
+          <a:prstGeom prst="rect">
+            <a:avLst/>
+          </a:prstGeom>
+          <a:noFill/>
+        </p:spPr>
+        <p:txBody>
+          <a:bodyPr wrap="none" rtlCol="0">
+            <a:spAutoFit/>
           </a:bodyPr>
           <a:lstStyle/>
           <a:p>
             <a:r>
-              <a:rPr lang="en-US" b="1" dirty="0"/>
-              <a:t>Lineage turnover </a:t>
-            </a:r>
-            <a:r>
-              <a:rPr lang="en-US" dirty="0"/>
-              <a:t>-- How do landscape characteristics influence the probability of detecting a daughter queen in the following spring?</a:t>
-            </a:r>
-          </a:p>
-          <a:p>
-            <a:r>
-              <a:rPr lang="en-US" b="1" dirty="0"/>
-              <a:t>Allelic turnover</a:t>
-            </a:r>
-            <a:r>
-              <a:rPr lang="en-US" dirty="0"/>
-              <a:t>–how does landscape influence allelic similarity/dissimilarity between year 1 and year 2?</a:t>
-            </a:r>
-          </a:p>
-          <a:p>
-            <a:r>
-              <a:rPr lang="en-US" b="1" dirty="0"/>
-              <a:t>Colony density </a:t>
-            </a:r>
-            <a:r>
-              <a:rPr lang="en-US" dirty="0"/>
-              <a:t>– How do landscape characteristics influence # of detected colonies; Which specific landcover types are associated with more colonies?</a:t>
-            </a:r>
-          </a:p>
-          <a:p>
-            <a:pPr lvl="1"/>
-            <a:r>
-              <a:rPr lang="en-US" dirty="0"/>
-              <a:t>Temporal aspect: accumulation of colonies through season?</a:t>
-            </a:r>
-          </a:p>
-          <a:p>
-            <a:pPr lvl="1"/>
-            <a:endParaRPr lang="en-US" dirty="0"/>
-          </a:p>
-          <a:p>
-            <a:r>
-              <a:rPr lang="en-US" b="1" dirty="0"/>
-              <a:t>Foraging distance-</a:t>
-            </a:r>
-            <a:r>
-              <a:rPr lang="en-US" dirty="0"/>
-              <a:t>–how do species vary in their “baseline” foraging ranges, and do they differ in their “plasticity” in response to floral resources?</a:t>
-            </a:r>
-          </a:p>
-          <a:p>
-            <a:r>
-              <a:rPr lang="en-US" b="1" dirty="0"/>
-              <a:t>Spatial aggregation / abundance of workers </a:t>
-            </a:r>
-            <a:r>
-              <a:rPr lang="en-US" dirty="0"/>
-              <a:t>– coefficient of variation of abundance?</a:t>
+              <a:rPr lang="en-US" dirty="0"/>
+              <a:t>(this last one would mostly be 1’s)</a:t>
+            </a:r>
+          </a:p>
+        </p:txBody>
+      </p:sp>
+      <p:sp>
+        <p:nvSpPr>
+          <p:cNvPr id="5" name="TextBox 4">
+            <a:extLst>
+              <a:ext uri="{FF2B5EF4-FFF2-40B4-BE49-F238E27FC236}">
+                <a16:creationId xmlns:a16="http://schemas.microsoft.com/office/drawing/2014/main" id="{CA796911-CCDA-3D32-249F-7DA4A39C7165}"/>
+              </a:ext>
+            </a:extLst>
+          </p:cNvPr>
+          <p:cNvSpPr txBox="1"/>
+          <p:nvPr/>
+        </p:nvSpPr>
+        <p:spPr>
+          <a:xfrm>
+            <a:off x="391885" y="1959429"/>
+            <a:ext cx="3195875" cy="369332"/>
+          </a:xfrm>
+          <a:prstGeom prst="rect">
+            <a:avLst/>
+          </a:prstGeom>
+          <a:noFill/>
+        </p:spPr>
+        <p:txBody>
+          <a:bodyPr wrap="none" rtlCol="0">
+            <a:spAutoFit/>
+          </a:bodyPr>
+          <a:lstStyle/>
+          <a:p>
+            <a:r>
+              <a:rPr lang="en-US" dirty="0"/>
+              <a:t>summed across all timepoints</a:t>
             </a:r>
           </a:p>
         </p:txBody>
@@ -3967,7 +4114,7 @@
     </p:spTree>
     <p:extLst>
       <p:ext uri="{BB962C8B-B14F-4D97-AF65-F5344CB8AC3E}">
-        <p14:creationId xmlns:p14="http://schemas.microsoft.com/office/powerpoint/2010/main" val="3589277737"/>
+        <p14:creationId xmlns:p14="http://schemas.microsoft.com/office/powerpoint/2010/main" val="2466428774"/>
       </p:ext>
     </p:extLst>
   </p:cSld>
@@ -3977,7 +4124,7 @@
 </p:sld>
 </file>
 
-<file path=ppt/slides/slide3.xml><?xml version="1.0" encoding="utf-8"?>
+<file path=ppt/slides/slide11.xml><?xml version="1.0" encoding="utf-8"?>
 <p:sld xmlns:a="http://schemas.openxmlformats.org/drawingml/2006/main" xmlns:r="http://schemas.openxmlformats.org/officeDocument/2006/relationships" xmlns:p="http://schemas.openxmlformats.org/presentationml/2006/main">
   <p:cSld>
     <p:spTree>
@@ -3999,7 +4146,7 @@
           <p:cNvPr id="2" name="Title 1">
             <a:extLst>
               <a:ext uri="{FF2B5EF4-FFF2-40B4-BE49-F238E27FC236}">
-                <a16:creationId xmlns:a16="http://schemas.microsoft.com/office/drawing/2014/main" id="{391CBEFB-EF1F-7195-FA77-B70EE3050846}"/>
+                <a16:creationId xmlns:a16="http://schemas.microsoft.com/office/drawing/2014/main" id="{D30DE1B7-C577-9634-D3AC-725282160ACB}"/>
               </a:ext>
             </a:extLst>
           </p:cNvPr>
@@ -4017,58 +4164,93 @@
           <a:p>
             <a:r>
               <a:rPr lang="en-US" dirty="0"/>
-              <a:t>Foraging distance</a:t>
-            </a:r>
-          </a:p>
-        </p:txBody>
-      </p:sp>
-      <p:sp>
-        <p:nvSpPr>
-          <p:cNvPr id="3" name="Content Placeholder 2">
-            <a:extLst>
-              <a:ext uri="{FF2B5EF4-FFF2-40B4-BE49-F238E27FC236}">
-                <a16:creationId xmlns:a16="http://schemas.microsoft.com/office/drawing/2014/main" id="{9E2A2717-84E3-AA21-07F8-0E56D06A2EB7}"/>
-              </a:ext>
-            </a:extLst>
-          </p:cNvPr>
-          <p:cNvSpPr>
-            <a:spLocks noGrp="1"/>
-          </p:cNvSpPr>
-          <p:nvPr>
-            <p:ph idx="1"/>
-          </p:nvPr>
-        </p:nvSpPr>
-        <p:spPr/>
-        <p:txBody>
-          <a:bodyPr/>
-          <a:lstStyle/>
-          <a:p>
-            <a:r>
-              <a:rPr lang="en-US" dirty="0"/>
-              <a:t>Foraging distance-–how do species vary in their “baseline” foraging ranges, and do they differ in their “plasticity” in response to floral resources?</a:t>
-            </a:r>
-          </a:p>
-          <a:p>
-            <a:r>
-              <a:rPr lang="en-US" dirty="0"/>
-              <a:t>In landscapes with more seminatural vegetation, are resource patches less attractive to foragers (from Pope &amp; Jha 2018) ** might need to do more simulation to validate whether this works</a:t>
-            </a:r>
-          </a:p>
-          <a:p>
-            <a:r>
-              <a:rPr lang="en-US" dirty="0"/>
-              <a:t>Spatial aggregation / abundance of workers – coefficient of variation of abundance?</a:t>
-            </a:r>
-          </a:p>
-          <a:p>
-            <a:endParaRPr lang="en-US" dirty="0"/>
+              <a:t>colony temporal span</a:t>
+            </a:r>
+          </a:p>
+        </p:txBody>
+      </p:sp>
+      <p:pic>
+        <p:nvPicPr>
+          <p:cNvPr id="5" name="Picture 4" descr="A graph of a graph showing a number of data&#10;&#10;AI-generated content may be incorrect.">
+            <a:extLst>
+              <a:ext uri="{FF2B5EF4-FFF2-40B4-BE49-F238E27FC236}">
+                <a16:creationId xmlns:a16="http://schemas.microsoft.com/office/drawing/2014/main" id="{2B8DFF2D-8746-3B61-8353-1A983F883EAC}"/>
+              </a:ext>
+            </a:extLst>
+          </p:cNvPr>
+          <p:cNvPicPr>
+            <a:picLocks noChangeAspect="1"/>
+          </p:cNvPicPr>
+          <p:nvPr/>
+        </p:nvPicPr>
+        <p:blipFill>
+          <a:blip r:embed="rId2"/>
+          <a:stretch>
+            <a:fillRect/>
+          </a:stretch>
+        </p:blipFill>
+        <p:spPr>
+          <a:xfrm>
+            <a:off x="4011385" y="1633928"/>
+            <a:ext cx="7772400" cy="5224072"/>
+          </a:xfrm>
+          <a:prstGeom prst="rect">
+            <a:avLst/>
+          </a:prstGeom>
+        </p:spPr>
+      </p:pic>
+      <p:sp>
+        <p:nvSpPr>
+          <p:cNvPr id="6" name="TextBox 5">
+            <a:extLst>
+              <a:ext uri="{FF2B5EF4-FFF2-40B4-BE49-F238E27FC236}">
+                <a16:creationId xmlns:a16="http://schemas.microsoft.com/office/drawing/2014/main" id="{8C001EA7-5396-21E1-A950-DD9D6BF689A3}"/>
+              </a:ext>
+            </a:extLst>
+          </p:cNvPr>
+          <p:cNvSpPr txBox="1"/>
+          <p:nvPr/>
+        </p:nvSpPr>
+        <p:spPr>
+          <a:xfrm>
+            <a:off x="930729" y="3886200"/>
+            <a:ext cx="1695977" cy="369332"/>
+          </a:xfrm>
+          <a:prstGeom prst="rect">
+            <a:avLst/>
+          </a:prstGeom>
+          <a:noFill/>
+        </p:spPr>
+        <p:txBody>
+          <a:bodyPr wrap="none" rtlCol="0">
+            <a:spAutoFit/>
+          </a:bodyPr>
+          <a:lstStyle/>
+          <a:p>
+            <a:r>
+              <a:rPr lang="en-US" i="1" dirty="0"/>
+              <a:t>B. </a:t>
+            </a:r>
+            <a:r>
+              <a:rPr lang="en-US" i="1" dirty="0" err="1"/>
+              <a:t>mixtus</a:t>
+            </a:r>
+            <a:r>
+              <a:rPr lang="en-US" i="1" dirty="0"/>
+              <a:t>, </a:t>
+            </a:r>
+            <a:r>
+              <a:rPr lang="en-US" dirty="0"/>
+              <a:t>2022</a:t>
+            </a:r>
+            <a:endParaRPr lang="en-US" i="1" dirty="0"/>
           </a:p>
         </p:txBody>
       </p:sp>
     </p:spTree>
     <p:extLst>
       <p:ext uri="{BB962C8B-B14F-4D97-AF65-F5344CB8AC3E}">
-        <p14:creationId xmlns:p14="http://schemas.microsoft.com/office/powerpoint/2010/main" val="4269190033"/>
+        <p14:creationId xmlns:p14="http://schemas.microsoft.com/office/powerpoint/2010/main" val="1613609768"/>
       </p:ext>
     </p:extLst>
   </p:cSld>
@@ -4078,7 +4260,7 @@
 </p:sld>
 </file>
 
-<file path=ppt/slides/slide4.xml><?xml version="1.0" encoding="utf-8"?>
+<file path=ppt/slides/slide12.xml><?xml version="1.0" encoding="utf-8"?>
 <p:sld xmlns:a="http://schemas.openxmlformats.org/drawingml/2006/main" xmlns:r="http://schemas.openxmlformats.org/officeDocument/2006/relationships" xmlns:p="http://schemas.openxmlformats.org/presentationml/2006/main">
   <p:cSld>
     <p:spTree>
@@ -4100,7 +4282,7 @@
           <p:cNvPr id="2" name="Title 1">
             <a:extLst>
               <a:ext uri="{FF2B5EF4-FFF2-40B4-BE49-F238E27FC236}">
-                <a16:creationId xmlns:a16="http://schemas.microsoft.com/office/drawing/2014/main" id="{F140850D-437B-E72C-E609-A41FC96C6E68}"/>
+                <a16:creationId xmlns:a16="http://schemas.microsoft.com/office/drawing/2014/main" id="{11110347-1F9F-2371-568C-889C0329863D}"/>
               </a:ext>
             </a:extLst>
           </p:cNvPr>
@@ -4111,14 +4293,19 @@
             <p:ph type="title"/>
           </p:nvPr>
         </p:nvSpPr>
-        <p:spPr/>
+        <p:spPr>
+          <a:xfrm>
+            <a:off x="838200" y="-271692"/>
+            <a:ext cx="10515600" cy="1325563"/>
+          </a:xfrm>
+        </p:spPr>
         <p:txBody>
           <a:bodyPr/>
           <a:lstStyle/>
           <a:p>
             <a:r>
               <a:rPr lang="en-US" dirty="0"/>
-              <a:t>Lineage turnover</a:t>
+              <a:t>temporal and spatial resolution</a:t>
             </a:r>
           </a:p>
         </p:txBody>
@@ -4128,7 +4315,7 @@
           <p:cNvPr id="3" name="Content Placeholder 2">
             <a:extLst>
               <a:ext uri="{FF2B5EF4-FFF2-40B4-BE49-F238E27FC236}">
-                <a16:creationId xmlns:a16="http://schemas.microsoft.com/office/drawing/2014/main" id="{CE155083-58A3-9922-0D96-58F7FE76BD7B}"/>
+                <a16:creationId xmlns:a16="http://schemas.microsoft.com/office/drawing/2014/main" id="{8B590F0A-DBDB-FAFB-4EFA-5032193C1023}"/>
               </a:ext>
             </a:extLst>
           </p:cNvPr>
@@ -4139,119 +4326,112 @@
             <p:ph idx="1"/>
           </p:nvPr>
         </p:nvSpPr>
-        <p:spPr/>
+        <p:spPr>
+          <a:xfrm>
+            <a:off x="838200" y="780595"/>
+            <a:ext cx="10515600" cy="5734502"/>
+          </a:xfrm>
+        </p:spPr>
         <p:txBody>
           <a:bodyPr>
-            <a:normAutofit fontScale="85000" lnSpcReduction="20000"/>
+            <a:noAutofit/>
           </a:bodyPr>
           <a:lstStyle/>
           <a:p>
             <a:r>
-              <a:rPr lang="en-US" dirty="0"/>
-              <a:t>How do landscape characteristics influence the probability of detecting a daughter queen in the following spring?</a:t>
-            </a:r>
-          </a:p>
-          <a:p>
-            <a:endParaRPr lang="en-US" dirty="0"/>
-          </a:p>
-          <a:p>
-            <a:r>
-              <a:rPr lang="en-US" dirty="0"/>
-              <a:t>Model: zero-inflated neg binomial?</a:t>
-            </a:r>
-          </a:p>
-          <a:p>
-            <a:endParaRPr lang="en-US" dirty="0"/>
-          </a:p>
-          <a:p>
-            <a:pPr marL="0" indent="0" algn="ctr">
-              <a:buNone/>
-            </a:pPr>
-            <a:r>
-              <a:rPr lang="en-US" sz="2400" dirty="0"/>
-              <a:t># of queens detected ~ </a:t>
-            </a:r>
-            <a:r>
-              <a:rPr lang="en-US" sz="2400" dirty="0" err="1"/>
-              <a:t>seminatural_area</a:t>
-            </a:r>
-            <a:r>
-              <a:rPr lang="en-US" sz="2400" dirty="0"/>
-              <a:t> + </a:t>
-            </a:r>
-            <a:r>
-              <a:rPr lang="en-US" sz="2400" dirty="0" err="1"/>
-              <a:t>interspersion_index</a:t>
-            </a:r>
-            <a:r>
-              <a:rPr lang="en-US" sz="2400" dirty="0"/>
-              <a:t> + offset</a:t>
-            </a:r>
-          </a:p>
-          <a:p>
-            <a:pPr marL="0" indent="0" algn="ctr">
-              <a:buNone/>
-            </a:pPr>
-            <a:endParaRPr lang="en-US" sz="2400" dirty="0"/>
-          </a:p>
-          <a:p>
-            <a:pPr marL="0" indent="0" algn="ctr">
-              <a:buNone/>
-            </a:pPr>
-            <a:r>
-              <a:rPr lang="en-US" sz="2400" dirty="0"/>
-              <a:t>offset = # of colonies observed at that site in the previous year?</a:t>
-            </a:r>
-          </a:p>
-          <a:p>
-            <a:pPr marL="0" indent="0" algn="ctr">
-              <a:buNone/>
-            </a:pPr>
-            <a:r>
-              <a:rPr lang="en-US" sz="2400" dirty="0"/>
-              <a:t>site level or transect level?</a:t>
-            </a:r>
-          </a:p>
-          <a:p>
-            <a:pPr marL="0" indent="0" algn="ctr">
-              <a:buNone/>
-            </a:pPr>
-            <a:endParaRPr lang="en-US" sz="2400" dirty="0"/>
-          </a:p>
-          <a:p>
-            <a:pPr marL="0" indent="0" algn="ctr">
-              <a:buNone/>
-            </a:pPr>
-            <a:r>
-              <a:rPr lang="en-US" sz="2400" dirty="0"/>
-              <a:t>Impatiens queens recaptures: W (22), SD (1), ED (7), NR (8), PM (4), HR(12)</a:t>
-            </a:r>
-          </a:p>
-          <a:p>
-            <a:pPr marL="0" indent="0" algn="ctr">
-              <a:buNone/>
-            </a:pPr>
-            <a:r>
-              <a:rPr lang="en-US" sz="2400" dirty="0" err="1"/>
-              <a:t>Mixtus</a:t>
-            </a:r>
-            <a:r>
-              <a:rPr lang="en-US" sz="2400" dirty="0"/>
-              <a:t> queens recaptures: W (4), SD (0), ED (0), NR (0), PM (1), HR(0)</a:t>
-            </a:r>
-          </a:p>
-          <a:p>
-            <a:pPr marL="0" indent="0" algn="ctr">
-              <a:buNone/>
-            </a:pPr>
-            <a:endParaRPr lang="en-US" sz="2400" dirty="0"/>
+              <a:rPr lang="en-US" sz="1800" b="1" dirty="0"/>
+              <a:t>Individual timepoints or averaged over year?</a:t>
+            </a:r>
+          </a:p>
+          <a:p>
+            <a:pPr lvl="2"/>
+            <a:r>
+              <a:rPr lang="en-US" sz="1800" dirty="0"/>
+              <a:t>Timepoints – I think this is such a cool aspect of the dataset and something we could leverage to make this paper unique—I’m just not sure how. Other pros: can relate Bombus abundance to specific floral communities, not averaged</a:t>
+            </a:r>
+          </a:p>
+          <a:p>
+            <a:pPr lvl="2"/>
+            <a:r>
+              <a:rPr lang="en-US" sz="1800" dirty="0"/>
+              <a:t>Averaged – Pros: don’t “double count” colonies, Cons: differences in sampling effort, and sampling effort spent during “peak” season is different than sampling effort spent during early/late season</a:t>
+            </a:r>
+          </a:p>
+          <a:p>
+            <a:pPr lvl="2"/>
+            <a:endParaRPr lang="en-US" sz="1800" dirty="0"/>
+          </a:p>
+          <a:p>
+            <a:r>
+              <a:rPr lang="en-US" sz="1800" b="1" dirty="0"/>
+              <a:t>Transects or site level?</a:t>
+            </a:r>
+          </a:p>
+          <a:p>
+            <a:pPr lvl="1"/>
+            <a:r>
+              <a:rPr lang="en-US" sz="1800" dirty="0"/>
+              <a:t>Transects – potentially finer spatial resolution, but we “double count” colonies occurring at multiple transects. May suffer from spatial autocorrelation but there are ways to deal with that via correlation matrices on ”random” intercepts</a:t>
+            </a:r>
+          </a:p>
+          <a:p>
+            <a:pPr lvl="1"/>
+            <a:r>
+              <a:rPr lang="en-US" sz="1800" dirty="0"/>
+              <a:t>Full sites—fewer datapoints, larger spatial resolution, may not be a lot of difference in landscape metrics between sites</a:t>
+            </a:r>
+          </a:p>
+          <a:p>
+            <a:r>
+              <a:rPr lang="en-US" sz="1800" dirty="0"/>
+              <a:t>Things that can </a:t>
+            </a:r>
+            <a:r>
+              <a:rPr lang="en-US" sz="1800" i="1" dirty="0"/>
+              <a:t>only </a:t>
+            </a:r>
+            <a:r>
+              <a:rPr lang="en-US" sz="1800" dirty="0"/>
+              <a:t>be done at site level:</a:t>
+            </a:r>
+          </a:p>
+          <a:p>
+            <a:pPr lvl="1"/>
+            <a:r>
+              <a:rPr lang="en-US" sz="1800" i="1" dirty="0"/>
+              <a:t>estimated </a:t>
+            </a:r>
+            <a:r>
+              <a:rPr lang="en-US" sz="1800" dirty="0"/>
+              <a:t>colony density (e.g., fit distribution of sibship sizes to a truncated Poisson) </a:t>
+            </a:r>
+          </a:p>
+          <a:p>
+            <a:pPr lvl="1"/>
+            <a:r>
+              <a:rPr lang="en-US" sz="1800" dirty="0"/>
+              <a:t>assess how complete is our sampling at different landscapes? for different species?</a:t>
+            </a:r>
+          </a:p>
+          <a:p>
+            <a:r>
+              <a:rPr lang="en-US" sz="1800" dirty="0"/>
+              <a:t>Other options:</a:t>
+            </a:r>
+          </a:p>
+          <a:p>
+            <a:pPr lvl="1"/>
+            <a:r>
+              <a:rPr lang="en-US" sz="1800" dirty="0"/>
+              <a:t>instead of measuring at each transect, we could use estimated posteriors for colony locations from foraging distance model</a:t>
+            </a:r>
           </a:p>
         </p:txBody>
       </p:sp>
     </p:spTree>
     <p:extLst>
       <p:ext uri="{BB962C8B-B14F-4D97-AF65-F5344CB8AC3E}">
-        <p14:creationId xmlns:p14="http://schemas.microsoft.com/office/powerpoint/2010/main" val="4169594659"/>
+        <p14:creationId xmlns:p14="http://schemas.microsoft.com/office/powerpoint/2010/main" val="2397056855"/>
       </p:ext>
     </p:extLst>
   </p:cSld>
@@ -4261,9 +4441,17 @@
 </p:sld>
 </file>
 
-<file path=ppt/slides/slide5.xml><?xml version="1.0" encoding="utf-8"?>
+<file path=ppt/slides/slide13.xml><?xml version="1.0" encoding="utf-8"?>
 <p:sld xmlns:a="http://schemas.openxmlformats.org/drawingml/2006/main" xmlns:r="http://schemas.openxmlformats.org/officeDocument/2006/relationships" xmlns:p="http://schemas.openxmlformats.org/presentationml/2006/main">
   <p:cSld>
+    <p:bg>
+      <p:bgPr>
+        <a:solidFill>
+          <a:schemeClr val="bg1"/>
+        </a:solidFill>
+        <a:effectLst/>
+      </p:bgPr>
+    </p:bg>
     <p:spTree>
       <p:nvGrpSpPr>
         <p:cNvPr id="1" name=""/>
@@ -4280,96 +4468,311 @@
       </p:grpSpPr>
       <p:sp>
         <p:nvSpPr>
-          <p:cNvPr id="2" name="Title 1">
-            <a:extLst>
-              <a:ext uri="{FF2B5EF4-FFF2-40B4-BE49-F238E27FC236}">
-                <a16:creationId xmlns:a16="http://schemas.microsoft.com/office/drawing/2014/main" id="{01035C16-5BD0-8A1C-ED80-9E8CFF49D29D}"/>
-              </a:ext>
-            </a:extLst>
-          </p:cNvPr>
-          <p:cNvSpPr>
-            <a:spLocks noGrp="1"/>
-          </p:cNvSpPr>
-          <p:nvPr>
-            <p:ph type="title"/>
-          </p:nvPr>
-        </p:nvSpPr>
-        <p:spPr/>
-        <p:txBody>
-          <a:bodyPr/>
-          <a:lstStyle/>
-          <a:p>
-            <a:r>
-              <a:rPr lang="en-US" dirty="0"/>
-              <a:t>Allelic turnover</a:t>
-            </a:r>
-          </a:p>
-        </p:txBody>
-      </p:sp>
-      <p:sp>
-        <p:nvSpPr>
-          <p:cNvPr id="3" name="Content Placeholder 2">
-            <a:extLst>
-              <a:ext uri="{FF2B5EF4-FFF2-40B4-BE49-F238E27FC236}">
-                <a16:creationId xmlns:a16="http://schemas.microsoft.com/office/drawing/2014/main" id="{0DCFBE56-E8D6-ADD3-40D7-C6AAE620DBF8}"/>
-              </a:ext>
-            </a:extLst>
-          </p:cNvPr>
-          <p:cNvSpPr>
-            <a:spLocks noGrp="1"/>
-          </p:cNvSpPr>
-          <p:nvPr>
-            <p:ph idx="1"/>
-          </p:nvPr>
-        </p:nvSpPr>
-        <p:spPr/>
-        <p:txBody>
-          <a:bodyPr/>
-          <a:lstStyle/>
-          <a:p>
-            <a:r>
-              <a:rPr lang="en-US" dirty="0"/>
-              <a:t>Calculate a dis-similarity metric between years for each transect?</a:t>
-            </a:r>
-          </a:p>
-          <a:p>
-            <a:endParaRPr lang="en-US" dirty="0"/>
-          </a:p>
-          <a:p>
-            <a:pPr marL="0" indent="0">
-              <a:buNone/>
-            </a:pPr>
-            <a:r>
-              <a:rPr lang="en-US" dirty="0"/>
-              <a:t>Allelic dissimilarity ~ </a:t>
-            </a:r>
-            <a:r>
-              <a:rPr lang="en-US" dirty="0" err="1"/>
-              <a:t>seminatural_area</a:t>
-            </a:r>
-            <a:r>
-              <a:rPr lang="en-US" dirty="0"/>
-              <a:t> + </a:t>
-            </a:r>
-            <a:r>
-              <a:rPr lang="en-US" dirty="0" err="1"/>
-              <a:t>interspersion_index</a:t>
-            </a:r>
-            <a:r>
-              <a:rPr lang="en-US" dirty="0"/>
-              <a:t> </a:t>
-            </a:r>
-          </a:p>
-          <a:p>
-            <a:pPr marL="0" indent="0">
-              <a:buNone/>
-            </a:pPr>
-            <a:endParaRPr lang="en-US" dirty="0"/>
-          </a:p>
-          <a:p>
-            <a:r>
-              <a:rPr lang="en-US" dirty="0"/>
-              <a:t>Or maybe better to do a null model/permutational approach—accounting for total number of observations at each location per year</a:t>
+          <p:cNvPr id="15" name="Rectangle 14">
+            <a:extLst>
+              <a:ext uri="{FF2B5EF4-FFF2-40B4-BE49-F238E27FC236}">
+                <a16:creationId xmlns:a16="http://schemas.microsoft.com/office/drawing/2014/main" id="{A9F529C3-C941-49FD-8C67-82F134F64BDB}"/>
+              </a:ext>
+              <a:ext uri="{C183D7F6-B498-43B3-948B-1728B52AA6E4}">
+                <adec:decorative xmlns:adec="http://schemas.microsoft.com/office/drawing/2017/decorative" val="1"/>
+              </a:ext>
+            </a:extLst>
+          </p:cNvPr>
+          <p:cNvSpPr>
+            <a:spLocks noGrp="1" noRot="1" noChangeAspect="1" noMove="1" noResize="1" noEditPoints="1" noAdjustHandles="1" noChangeArrowheads="1" noChangeShapeType="1" noTextEdit="1"/>
+          </p:cNvSpPr>
+          <p:nvPr>
+            <p:extLst>
+              <p:ext uri="{386F3935-93C4-4BCD-93E2-E3B085C9AB24}">
+                <p16:designElem xmlns:p16="http://schemas.microsoft.com/office/powerpoint/2015/main" val="1"/>
+              </p:ext>
+            </p:extLst>
+          </p:nvPr>
+        </p:nvSpPr>
+        <p:spPr>
+          <a:xfrm>
+            <a:off x="0" y="0"/>
+            <a:ext cx="12192000" cy="6858000"/>
+          </a:xfrm>
+          <a:prstGeom prst="rect">
+            <a:avLst/>
+          </a:prstGeom>
+          <a:solidFill>
+            <a:schemeClr val="tx1">
+              <a:lumMod val="50000"/>
+              <a:lumOff val="50000"/>
+              <a:alpha val="30000"/>
+            </a:schemeClr>
+          </a:solidFill>
+          <a:ln>
+            <a:noFill/>
+          </a:ln>
+        </p:spPr>
+        <p:style>
+          <a:lnRef idx="2">
+            <a:schemeClr val="accent1">
+              <a:shade val="50000"/>
+            </a:schemeClr>
+          </a:lnRef>
+          <a:fillRef idx="1">
+            <a:schemeClr val="accent1"/>
+          </a:fillRef>
+          <a:effectRef idx="0">
+            <a:schemeClr val="accent1"/>
+          </a:effectRef>
+          <a:fontRef idx="minor">
+            <a:schemeClr val="lt1"/>
+          </a:fontRef>
+        </p:style>
+        <p:txBody>
+          <a:bodyPr rtlCol="0" anchor="ctr"/>
+          <a:lstStyle/>
+          <a:p>
+            <a:pPr algn="ctr"/>
+            <a:endParaRPr lang="en-US"/>
+          </a:p>
+        </p:txBody>
+      </p:sp>
+      <p:sp>
+        <p:nvSpPr>
+          <p:cNvPr id="14" name="Rectangle 13">
+            <a:extLst>
+              <a:ext uri="{FF2B5EF4-FFF2-40B4-BE49-F238E27FC236}">
+                <a16:creationId xmlns:a16="http://schemas.microsoft.com/office/drawing/2014/main" id="{20586029-32A0-47E5-9AEC-AE3ABA6B94D0}"/>
+              </a:ext>
+              <a:ext uri="{C183D7F6-B498-43B3-948B-1728B52AA6E4}">
+                <adec:decorative xmlns:adec="http://schemas.microsoft.com/office/drawing/2017/decorative" val="1"/>
+              </a:ext>
+            </a:extLst>
+          </p:cNvPr>
+          <p:cNvSpPr>
+            <a:spLocks noGrp="1" noRot="1" noChangeAspect="1" noMove="1" noResize="1" noEditPoints="1" noAdjustHandles="1" noChangeArrowheads="1" noChangeShapeType="1" noTextEdit="1"/>
+          </p:cNvSpPr>
+          <p:nvPr>
+            <p:extLst>
+              <p:ext uri="{386F3935-93C4-4BCD-93E2-E3B085C9AB24}">
+                <p16:designElem xmlns:p16="http://schemas.microsoft.com/office/powerpoint/2015/main" val="1"/>
+              </p:ext>
+            </p:extLst>
+          </p:nvPr>
+        </p:nvSpPr>
+        <p:spPr>
+          <a:xfrm>
+            <a:off x="477012" y="480060"/>
+            <a:ext cx="11237976" cy="5897880"/>
+          </a:xfrm>
+          <a:prstGeom prst="rect">
+            <a:avLst/>
+          </a:prstGeom>
+          <a:solidFill>
+            <a:srgbClr val="FFFFFF"/>
+          </a:solidFill>
+          <a:ln w="9525">
+            <a:noFill/>
+          </a:ln>
+          <a:effectLst>
+            <a:outerShdw blurRad="63500" dist="17780" dir="5400000" algn="t" rotWithShape="0">
+              <a:prstClr val="black">
+                <a:alpha val="43000"/>
+              </a:prstClr>
+            </a:outerShdw>
+          </a:effectLst>
+        </p:spPr>
+        <p:style>
+          <a:lnRef idx="2">
+            <a:schemeClr val="accent1">
+              <a:shade val="50000"/>
+            </a:schemeClr>
+          </a:lnRef>
+          <a:fillRef idx="1">
+            <a:schemeClr val="accent1"/>
+          </a:fillRef>
+          <a:effectRef idx="0">
+            <a:schemeClr val="accent1"/>
+          </a:effectRef>
+          <a:fontRef idx="minor">
+            <a:schemeClr val="lt1"/>
+          </a:fontRef>
+        </p:style>
+        <p:txBody>
+          <a:bodyPr rtlCol="0" anchor="ctr"/>
+          <a:lstStyle/>
+          <a:p>
+            <a:pPr algn="ctr"/>
+            <a:endParaRPr lang="en-US"/>
+          </a:p>
+        </p:txBody>
+      </p:sp>
+      <p:pic>
+        <p:nvPicPr>
+          <p:cNvPr id="7" name="Picture 6">
+            <a:extLst>
+              <a:ext uri="{FF2B5EF4-FFF2-40B4-BE49-F238E27FC236}">
+                <a16:creationId xmlns:a16="http://schemas.microsoft.com/office/drawing/2014/main" id="{69AB1DF1-3862-D775-3A1C-686AE880A967}"/>
+              </a:ext>
+            </a:extLst>
+          </p:cNvPr>
+          <p:cNvPicPr>
+            <a:picLocks noChangeAspect="1"/>
+          </p:cNvPicPr>
+          <p:nvPr/>
+        </p:nvPicPr>
+        <p:blipFill>
+          <a:blip r:embed="rId2"/>
+          <a:stretch>
+            <a:fillRect/>
+          </a:stretch>
+        </p:blipFill>
+        <p:spPr>
+          <a:xfrm>
+            <a:off x="643467" y="1112561"/>
+            <a:ext cx="5294716" cy="4632876"/>
+          </a:xfrm>
+          <a:prstGeom prst="rect">
+            <a:avLst/>
+          </a:prstGeom>
+        </p:spPr>
+      </p:pic>
+      <p:cxnSp>
+        <p:nvCxnSpPr>
+          <p:cNvPr id="16" name="Straight Connector 15">
+            <a:extLst>
+              <a:ext uri="{FF2B5EF4-FFF2-40B4-BE49-F238E27FC236}">
+                <a16:creationId xmlns:a16="http://schemas.microsoft.com/office/drawing/2014/main" id="{8C730EAB-A532-4295-A302-FB4B90DB9F5E}"/>
+              </a:ext>
+              <a:ext uri="{C183D7F6-B498-43B3-948B-1728B52AA6E4}">
+                <adec:decorative xmlns:adec="http://schemas.microsoft.com/office/drawing/2017/decorative" val="1"/>
+              </a:ext>
+            </a:extLst>
+          </p:cNvPr>
+          <p:cNvCxnSpPr>
+            <a:cxnSpLocks noGrp="1" noRot="1" noChangeAspect="1" noMove="1" noResize="1" noEditPoints="1" noAdjustHandles="1" noChangeArrowheads="1" noChangeShapeType="1"/>
+          </p:cNvCxnSpPr>
+          <p:nvPr>
+            <p:extLst>
+              <p:ext uri="{386F3935-93C4-4BCD-93E2-E3B085C9AB24}">
+                <p16:designElem xmlns:p16="http://schemas.microsoft.com/office/powerpoint/2015/main" val="1"/>
+              </p:ext>
+            </p:extLst>
+          </p:nvPr>
+        </p:nvCxnSpPr>
+        <p:spPr>
+          <a:xfrm>
+            <a:off x="6079958" y="1143000"/>
+            <a:ext cx="0" cy="4572000"/>
+          </a:xfrm>
+          <a:prstGeom prst="line">
+            <a:avLst/>
+          </a:prstGeom>
+          <a:ln>
+            <a:solidFill>
+              <a:srgbClr val="4E4E4E"/>
+            </a:solidFill>
+          </a:ln>
+        </p:spPr>
+        <p:style>
+          <a:lnRef idx="1">
+            <a:schemeClr val="accent1"/>
+          </a:lnRef>
+          <a:fillRef idx="0">
+            <a:schemeClr val="accent1"/>
+          </a:fillRef>
+          <a:effectRef idx="0">
+            <a:schemeClr val="accent1"/>
+          </a:effectRef>
+          <a:fontRef idx="minor">
+            <a:schemeClr val="tx1"/>
+          </a:fontRef>
+        </p:style>
+      </p:cxnSp>
+      <p:pic>
+        <p:nvPicPr>
+          <p:cNvPr id="5" name="Picture 4">
+            <a:extLst>
+              <a:ext uri="{FF2B5EF4-FFF2-40B4-BE49-F238E27FC236}">
+                <a16:creationId xmlns:a16="http://schemas.microsoft.com/office/drawing/2014/main" id="{015BC480-6528-C0D1-2C40-381727C1E93B}"/>
+              </a:ext>
+            </a:extLst>
+          </p:cNvPr>
+          <p:cNvPicPr>
+            <a:picLocks noChangeAspect="1"/>
+          </p:cNvPicPr>
+          <p:nvPr/>
+        </p:nvPicPr>
+        <p:blipFill>
+          <a:blip r:embed="rId3"/>
+          <a:stretch>
+            <a:fillRect/>
+          </a:stretch>
+        </p:blipFill>
+        <p:spPr>
+          <a:xfrm>
+            <a:off x="6253817" y="1112562"/>
+            <a:ext cx="5294715" cy="4632875"/>
+          </a:xfrm>
+          <a:prstGeom prst="rect">
+            <a:avLst/>
+          </a:prstGeom>
+        </p:spPr>
+      </p:pic>
+      <p:sp>
+        <p:nvSpPr>
+          <p:cNvPr id="8" name="TextBox 7">
+            <a:extLst>
+              <a:ext uri="{FF2B5EF4-FFF2-40B4-BE49-F238E27FC236}">
+                <a16:creationId xmlns:a16="http://schemas.microsoft.com/office/drawing/2014/main" id="{A08F704D-AB2B-CEBF-30E7-94762AC1E7E5}"/>
+              </a:ext>
+            </a:extLst>
+          </p:cNvPr>
+          <p:cNvSpPr txBox="1"/>
+          <p:nvPr/>
+        </p:nvSpPr>
+        <p:spPr>
+          <a:xfrm>
+            <a:off x="6890657" y="5745437"/>
+            <a:ext cx="4506685" cy="832757"/>
+          </a:xfrm>
+          <a:prstGeom prst="rect">
+            <a:avLst/>
+          </a:prstGeom>
+          <a:noFill/>
+        </p:spPr>
+        <p:txBody>
+          <a:bodyPr wrap="square" rtlCol="0">
+            <a:spAutoFit/>
+          </a:bodyPr>
+          <a:lstStyle/>
+          <a:p>
+            <a:r>
+              <a:rPr lang="en-US" sz="1200" dirty="0"/>
+              <a:t>Interspersion + juxtaposition index: </a:t>
+            </a:r>
+            <a:r>
+              <a:rPr lang="en-US" sz="1200" dirty="0">
+                <a:solidFill>
+                  <a:srgbClr val="3E3F3A"/>
+                </a:solidFill>
+                <a:latin typeface="Roboto" panose="02000000000000000000" pitchFamily="2" charset="0"/>
+              </a:rPr>
+              <a:t>a</a:t>
+            </a:r>
+            <a:r>
+              <a:rPr lang="en-US" altLang="en-US" sz="1200" dirty="0">
+                <a:solidFill>
+                  <a:srgbClr val="3E3F3A"/>
+                </a:solidFill>
+                <a:latin typeface="Roboto" panose="02000000000000000000" pitchFamily="2" charset="0"/>
+              </a:rPr>
+              <a:t>pproaches 0 if a class is only adjacent to a single other class and equals 100 when a class is equally adjacent to all other classes.</a:t>
+            </a:r>
+            <a:endParaRPr lang="en-US" altLang="en-US" sz="1600" dirty="0">
+              <a:latin typeface="Arial" panose="020B0604020202020204" pitchFamily="34" charset="0"/>
+            </a:endParaRPr>
+          </a:p>
+          <a:p>
+            <a:r>
+              <a:rPr lang="en-US" sz="1200" dirty="0"/>
+              <a:t>  </a:t>
             </a:r>
           </a:p>
         </p:txBody>
@@ -4377,7 +4780,7 @@
     </p:spTree>
     <p:extLst>
       <p:ext uri="{BB962C8B-B14F-4D97-AF65-F5344CB8AC3E}">
-        <p14:creationId xmlns:p14="http://schemas.microsoft.com/office/powerpoint/2010/main" val="1237083577"/>
+        <p14:creationId xmlns:p14="http://schemas.microsoft.com/office/powerpoint/2010/main" val="3576636559"/>
       </p:ext>
     </p:extLst>
   </p:cSld>
@@ -4387,193 +4790,7 @@
 </p:sld>
 </file>
 
-<file path=ppt/slides/slide6.xml><?xml version="1.0" encoding="utf-8"?>
-<p:sld xmlns:a="http://schemas.openxmlformats.org/drawingml/2006/main" xmlns:r="http://schemas.openxmlformats.org/officeDocument/2006/relationships" xmlns:p="http://schemas.openxmlformats.org/presentationml/2006/main">
-  <p:cSld>
-    <p:spTree>
-      <p:nvGrpSpPr>
-        <p:cNvPr id="1" name=""/>
-        <p:cNvGrpSpPr/>
-        <p:nvPr/>
-      </p:nvGrpSpPr>
-      <p:grpSpPr>
-        <a:xfrm>
-          <a:off x="0" y="0"/>
-          <a:ext cx="0" cy="0"/>
-          <a:chOff x="0" y="0"/>
-          <a:chExt cx="0" cy="0"/>
-        </a:xfrm>
-      </p:grpSpPr>
-      <p:sp>
-        <p:nvSpPr>
-          <p:cNvPr id="2" name="Title 1">
-            <a:extLst>
-              <a:ext uri="{FF2B5EF4-FFF2-40B4-BE49-F238E27FC236}">
-                <a16:creationId xmlns:a16="http://schemas.microsoft.com/office/drawing/2014/main" id="{2EAD2895-3113-E459-CD7D-FFB971CF63CB}"/>
-              </a:ext>
-            </a:extLst>
-          </p:cNvPr>
-          <p:cNvSpPr>
-            <a:spLocks noGrp="1"/>
-          </p:cNvSpPr>
-          <p:nvPr>
-            <p:ph type="title"/>
-          </p:nvPr>
-        </p:nvSpPr>
-        <p:spPr/>
-        <p:txBody>
-          <a:bodyPr/>
-          <a:lstStyle/>
-          <a:p>
-            <a:r>
-              <a:rPr lang="en-US" dirty="0"/>
-              <a:t>Colony density</a:t>
-            </a:r>
-          </a:p>
-        </p:txBody>
-      </p:sp>
-      <p:sp>
-        <p:nvSpPr>
-          <p:cNvPr id="3" name="Content Placeholder 2">
-            <a:extLst>
-              <a:ext uri="{FF2B5EF4-FFF2-40B4-BE49-F238E27FC236}">
-                <a16:creationId xmlns:a16="http://schemas.microsoft.com/office/drawing/2014/main" id="{9FC24658-1BE2-F838-F7FF-775CA2B07FAD}"/>
-              </a:ext>
-            </a:extLst>
-          </p:cNvPr>
-          <p:cNvSpPr>
-            <a:spLocks noGrp="1"/>
-          </p:cNvSpPr>
-          <p:nvPr>
-            <p:ph idx="1"/>
-          </p:nvPr>
-        </p:nvSpPr>
-        <p:spPr>
-          <a:xfrm>
-            <a:off x="210069" y="1825625"/>
-            <a:ext cx="11850130" cy="4351338"/>
-          </a:xfrm>
-        </p:spPr>
-        <p:txBody>
-          <a:bodyPr>
-            <a:normAutofit fontScale="77500" lnSpcReduction="20000"/>
-          </a:bodyPr>
-          <a:lstStyle/>
-          <a:p>
-            <a:r>
-              <a:rPr lang="en-US" dirty="0"/>
-              <a:t>How do landscape characteristics influence # of detected colonies?</a:t>
-            </a:r>
-          </a:p>
-          <a:p>
-            <a:endParaRPr lang="en-US" dirty="0"/>
-          </a:p>
-          <a:p>
-            <a:pPr marL="0" indent="0" algn="ctr">
-              <a:buNone/>
-            </a:pPr>
-            <a:r>
-              <a:rPr lang="en-US" sz="2200" b="1" dirty="0"/>
-              <a:t>raw colony density at each transect (site?) ~ </a:t>
-            </a:r>
-            <a:r>
-              <a:rPr lang="en-US" sz="2200" b="1" dirty="0" err="1"/>
-              <a:t>seminatural_area</a:t>
-            </a:r>
-            <a:r>
-              <a:rPr lang="en-US" sz="2200" b="1" dirty="0"/>
-              <a:t> + </a:t>
-            </a:r>
-            <a:r>
-              <a:rPr lang="en-US" sz="2200" b="1" dirty="0" err="1"/>
-              <a:t>interspersion_index</a:t>
-            </a:r>
-            <a:r>
-              <a:rPr lang="en-US" sz="2200" b="1" dirty="0"/>
-              <a:t> + offset</a:t>
-            </a:r>
-          </a:p>
-          <a:p>
-            <a:pPr marL="0" indent="0" algn="ctr">
-              <a:buNone/>
-            </a:pPr>
-            <a:endParaRPr lang="en-US" sz="2200" b="1" dirty="0"/>
-          </a:p>
-          <a:p>
-            <a:pPr algn="ctr">
-              <a:buFontTx/>
-              <a:buChar char="-"/>
-            </a:pPr>
-            <a:r>
-              <a:rPr lang="en-US" sz="2600" dirty="0"/>
-              <a:t>can also use </a:t>
-            </a:r>
-            <a:r>
-              <a:rPr lang="en-US" sz="2600" i="1" dirty="0"/>
-              <a:t>estimated </a:t>
-            </a:r>
-            <a:r>
-              <a:rPr lang="en-US" sz="2600" dirty="0"/>
-              <a:t>colony density (e.g., fit distribution of sibship sizes to a truncated Poisson) – might only work at site level…</a:t>
-            </a:r>
-          </a:p>
-          <a:p>
-            <a:pPr algn="ctr">
-              <a:buFontTx/>
-              <a:buChar char="-"/>
-            </a:pPr>
-            <a:r>
-              <a:rPr lang="en-US" sz="2600" dirty="0"/>
-              <a:t>instead of measuring at each transect, we could use estimated posteriors for colony locations from foraging distance model—a bit like what Sarah Knoerr did, but a more flexible approach</a:t>
-            </a:r>
-          </a:p>
-          <a:p>
-            <a:endParaRPr lang="en-US" sz="2600" dirty="0"/>
-          </a:p>
-          <a:p>
-            <a:r>
-              <a:rPr lang="en-US" dirty="0"/>
-              <a:t>Which specific landcover types are associated with more colonies?</a:t>
-            </a:r>
-          </a:p>
-          <a:p>
-            <a:pPr lvl="1"/>
-            <a:r>
-              <a:rPr lang="en-US" dirty="0"/>
-              <a:t>Differential abundance analysis? Not totally sure how to do this but could read some papers</a:t>
-            </a:r>
-          </a:p>
-          <a:p>
-            <a:pPr marL="0" indent="0">
-              <a:buNone/>
-            </a:pPr>
-            <a:endParaRPr lang="en-US" dirty="0"/>
-          </a:p>
-          <a:p>
-            <a:r>
-              <a:rPr lang="en-US" dirty="0"/>
-              <a:t>Temporal aspect: accumulation of colonies through season?</a:t>
-            </a:r>
-          </a:p>
-          <a:p>
-            <a:endParaRPr lang="en-US" dirty="0"/>
-          </a:p>
-        </p:txBody>
-      </p:sp>
-    </p:spTree>
-    <p:extLst>
-      <p:ext uri="{BB962C8B-B14F-4D97-AF65-F5344CB8AC3E}">
-        <p14:creationId xmlns:p14="http://schemas.microsoft.com/office/powerpoint/2010/main" val="3069418217"/>
-      </p:ext>
-    </p:extLst>
-  </p:cSld>
-  <p:clrMapOvr>
-    <a:masterClrMapping/>
-  </p:clrMapOvr>
-</p:sld>
-</file>
-
-<file path=ppt/slides/slide7.xml><?xml version="1.0" encoding="utf-8"?>
+<file path=ppt/slides/slide14.xml><?xml version="1.0" encoding="utf-8"?>
 <p:sld xmlns:a="http://schemas.openxmlformats.org/drawingml/2006/main" xmlns:r="http://schemas.openxmlformats.org/officeDocument/2006/relationships" xmlns:p="http://schemas.openxmlformats.org/presentationml/2006/main">
   <p:cSld>
     <p:spTree>
@@ -5002,6 +5219,1099 @@
 </p:sld>
 </file>
 
+<file path=ppt/slides/slide15.xml><?xml version="1.0" encoding="utf-8"?>
+<p:sld xmlns:a="http://schemas.openxmlformats.org/drawingml/2006/main" xmlns:r="http://schemas.openxmlformats.org/officeDocument/2006/relationships" xmlns:p="http://schemas.openxmlformats.org/presentationml/2006/main">
+  <p:cSld>
+    <p:spTree>
+      <p:nvGrpSpPr>
+        <p:cNvPr id="1" name=""/>
+        <p:cNvGrpSpPr/>
+        <p:nvPr/>
+      </p:nvGrpSpPr>
+      <p:grpSpPr>
+        <a:xfrm>
+          <a:off x="0" y="0"/>
+          <a:ext cx="0" cy="0"/>
+          <a:chOff x="0" y="0"/>
+          <a:chExt cx="0" cy="0"/>
+        </a:xfrm>
+      </p:grpSpPr>
+      <p:sp>
+        <p:nvSpPr>
+          <p:cNvPr id="2" name="Title 1">
+            <a:extLst>
+              <a:ext uri="{FF2B5EF4-FFF2-40B4-BE49-F238E27FC236}">
+                <a16:creationId xmlns:a16="http://schemas.microsoft.com/office/drawing/2014/main" id="{E6941D5D-3F5F-C4A0-45DF-4D2002A5DEAB}"/>
+              </a:ext>
+            </a:extLst>
+          </p:cNvPr>
+          <p:cNvSpPr>
+            <a:spLocks noGrp="1"/>
+          </p:cNvSpPr>
+          <p:nvPr>
+            <p:ph type="title"/>
+          </p:nvPr>
+        </p:nvSpPr>
+        <p:spPr/>
+        <p:txBody>
+          <a:bodyPr/>
+          <a:lstStyle/>
+          <a:p>
+            <a:r>
+              <a:rPr lang="en-US" dirty="0"/>
+              <a:t>Foraging / Nest Density Framing</a:t>
+            </a:r>
+          </a:p>
+        </p:txBody>
+      </p:sp>
+      <p:sp>
+        <p:nvSpPr>
+          <p:cNvPr id="3" name="Content Placeholder 2">
+            <a:extLst>
+              <a:ext uri="{FF2B5EF4-FFF2-40B4-BE49-F238E27FC236}">
+                <a16:creationId xmlns:a16="http://schemas.microsoft.com/office/drawing/2014/main" id="{2065FB76-89D1-D545-80F2-A105221032A4}"/>
+              </a:ext>
+            </a:extLst>
+          </p:cNvPr>
+          <p:cNvSpPr>
+            <a:spLocks noGrp="1"/>
+          </p:cNvSpPr>
+          <p:nvPr>
+            <p:ph idx="1"/>
+          </p:nvPr>
+        </p:nvSpPr>
+        <p:spPr/>
+        <p:txBody>
+          <a:bodyPr>
+            <a:normAutofit fontScale="85000" lnSpcReduction="20000"/>
+          </a:bodyPr>
+          <a:lstStyle/>
+          <a:p>
+            <a:pPr marL="514350" indent="-514350">
+              <a:buAutoNum type="arabicParenBoth"/>
+            </a:pPr>
+            <a:r>
+              <a:rPr lang="en-US" dirty="0"/>
+              <a:t>Bees are important</a:t>
+            </a:r>
+          </a:p>
+          <a:p>
+            <a:pPr marL="514350" indent="-514350">
+              <a:buAutoNum type="arabicParenBoth"/>
+            </a:pPr>
+            <a:r>
+              <a:rPr lang="en-US" dirty="0"/>
+              <a:t>Ag intensification leads to fragmentation of seminatural veg + nesting habitat</a:t>
+            </a:r>
+          </a:p>
+          <a:p>
+            <a:pPr marL="514350" indent="-514350">
+              <a:buAutoNum type="arabicParenBoth"/>
+            </a:pPr>
+            <a:r>
+              <a:rPr lang="en-US" dirty="0"/>
+              <a:t>Bumblebees vary in nesting preferences, foraging distance, phenology, food plant </a:t>
+            </a:r>
+            <a:r>
+              <a:rPr lang="en-US" dirty="0" err="1"/>
+              <a:t>prefs</a:t>
+            </a:r>
+            <a:endParaRPr lang="en-US" dirty="0"/>
+          </a:p>
+          <a:p>
+            <a:pPr marL="514350" indent="-514350">
+              <a:buAutoNum type="arabicParenBoth"/>
+            </a:pPr>
+            <a:r>
+              <a:rPr lang="en-US" dirty="0"/>
+              <a:t>The interaction of </a:t>
+            </a:r>
+            <a:r>
+              <a:rPr lang="en-US" dirty="0" err="1"/>
+              <a:t>spp</a:t>
+            </a:r>
+            <a:r>
+              <a:rPr lang="en-US" dirty="0"/>
+              <a:t> traits with biotic/abiotic conditions influences </a:t>
+            </a:r>
+            <a:r>
+              <a:rPr lang="en-US" dirty="0" err="1"/>
+              <a:t>spp</a:t>
+            </a:r>
+            <a:r>
+              <a:rPr lang="en-US" dirty="0"/>
+              <a:t> response to land use intensification</a:t>
+            </a:r>
+          </a:p>
+          <a:p>
+            <a:pPr marL="514350" indent="-514350">
+              <a:buAutoNum type="arabicParenBoth"/>
+            </a:pPr>
+            <a:r>
+              <a:rPr lang="en-US" dirty="0"/>
+              <a:t>Questions:</a:t>
+            </a:r>
+          </a:p>
+          <a:p>
+            <a:pPr marL="971550" lvl="1" indent="-514350">
+              <a:buAutoNum type="arabicParenBoth"/>
+            </a:pPr>
+            <a:r>
+              <a:rPr lang="en-US" dirty="0"/>
+              <a:t>How does foraging distance vary between </a:t>
+            </a:r>
+            <a:r>
+              <a:rPr lang="en-US" dirty="0" err="1"/>
+              <a:t>spp</a:t>
+            </a:r>
+            <a:r>
+              <a:rPr lang="en-US" dirty="0"/>
+              <a:t>, and to what degree do high quality or abundance floral resources </a:t>
+            </a:r>
+            <a:r>
+              <a:rPr lang="en-US" i="1" dirty="0"/>
+              <a:t>drive </a:t>
+            </a:r>
+            <a:r>
+              <a:rPr lang="en-US" dirty="0"/>
+              <a:t>this difference?</a:t>
+            </a:r>
+          </a:p>
+          <a:p>
+            <a:pPr marL="971550" lvl="1" indent="-514350">
+              <a:buAutoNum type="arabicParenBoth"/>
+            </a:pPr>
+            <a:r>
+              <a:rPr lang="en-US" dirty="0"/>
+              <a:t>Do species have different land use type association </a:t>
+            </a:r>
+            <a:r>
+              <a:rPr lang="en-US" dirty="0" err="1"/>
+              <a:t>wrt</a:t>
+            </a:r>
+            <a:r>
+              <a:rPr lang="en-US" dirty="0"/>
+              <a:t> colony density or nest searching?</a:t>
+            </a:r>
+          </a:p>
+          <a:p>
+            <a:pPr marL="971550" lvl="1" indent="-514350">
+              <a:buAutoNum type="arabicParenBoth"/>
+            </a:pPr>
+            <a:r>
+              <a:rPr lang="en-US" dirty="0"/>
+              <a:t>At what rate do we observe daughter queen in the following year? Is this different for different </a:t>
+            </a:r>
+            <a:r>
+              <a:rPr lang="en-US" dirty="0" err="1"/>
+              <a:t>spp</a:t>
+            </a:r>
+            <a:r>
+              <a:rPr lang="en-US" dirty="0"/>
+              <a:t>?</a:t>
+            </a:r>
+          </a:p>
+        </p:txBody>
+      </p:sp>
+    </p:spTree>
+    <p:extLst>
+      <p:ext uri="{BB962C8B-B14F-4D97-AF65-F5344CB8AC3E}">
+        <p14:creationId xmlns:p14="http://schemas.microsoft.com/office/powerpoint/2010/main" val="3879349738"/>
+      </p:ext>
+    </p:extLst>
+  </p:cSld>
+  <p:clrMapOvr>
+    <a:masterClrMapping/>
+  </p:clrMapOvr>
+</p:sld>
+</file>
+
+<file path=ppt/slides/slide16.xml><?xml version="1.0" encoding="utf-8"?>
+<p:sld xmlns:a="http://schemas.openxmlformats.org/drawingml/2006/main" xmlns:r="http://schemas.openxmlformats.org/officeDocument/2006/relationships" xmlns:p="http://schemas.openxmlformats.org/presentationml/2006/main">
+  <p:cSld>
+    <p:spTree>
+      <p:nvGrpSpPr>
+        <p:cNvPr id="1" name=""/>
+        <p:cNvGrpSpPr/>
+        <p:nvPr/>
+      </p:nvGrpSpPr>
+      <p:grpSpPr>
+        <a:xfrm>
+          <a:off x="0" y="0"/>
+          <a:ext cx="0" cy="0"/>
+          <a:chOff x="0" y="0"/>
+          <a:chExt cx="0" cy="0"/>
+        </a:xfrm>
+      </p:grpSpPr>
+      <p:sp>
+        <p:nvSpPr>
+          <p:cNvPr id="2" name="Title 1">
+            <a:extLst>
+              <a:ext uri="{FF2B5EF4-FFF2-40B4-BE49-F238E27FC236}">
+                <a16:creationId xmlns:a16="http://schemas.microsoft.com/office/drawing/2014/main" id="{F9BE05C7-78FC-AB53-A801-AC4AC5974AD1}"/>
+              </a:ext>
+            </a:extLst>
+          </p:cNvPr>
+          <p:cNvSpPr>
+            <a:spLocks noGrp="1"/>
+          </p:cNvSpPr>
+          <p:nvPr>
+            <p:ph type="title"/>
+          </p:nvPr>
+        </p:nvSpPr>
+        <p:spPr/>
+        <p:txBody>
+          <a:bodyPr/>
+          <a:lstStyle/>
+          <a:p>
+            <a:r>
+              <a:rPr lang="en-US" dirty="0"/>
+              <a:t>Foraging</a:t>
+            </a:r>
+          </a:p>
+        </p:txBody>
+      </p:sp>
+      <p:sp>
+        <p:nvSpPr>
+          <p:cNvPr id="3" name="Content Placeholder 2">
+            <a:extLst>
+              <a:ext uri="{FF2B5EF4-FFF2-40B4-BE49-F238E27FC236}">
+                <a16:creationId xmlns:a16="http://schemas.microsoft.com/office/drawing/2014/main" id="{926B92B6-2CAD-2A83-BDFE-223DAA40C0CF}"/>
+              </a:ext>
+            </a:extLst>
+          </p:cNvPr>
+          <p:cNvSpPr>
+            <a:spLocks noGrp="1"/>
+          </p:cNvSpPr>
+          <p:nvPr>
+            <p:ph idx="1"/>
+          </p:nvPr>
+        </p:nvSpPr>
+        <p:spPr/>
+        <p:txBody>
+          <a:bodyPr>
+            <a:normAutofit lnSpcReduction="10000"/>
+          </a:bodyPr>
+          <a:lstStyle/>
+          <a:p>
+            <a:r>
+              <a:rPr lang="en-US" dirty="0"/>
+              <a:t>Foraging in relation to pollination services</a:t>
+            </a:r>
+          </a:p>
+          <a:p>
+            <a:r>
+              <a:rPr lang="en-US" dirty="0"/>
+              <a:t>Estimate parameters for patch attractiveness</a:t>
+            </a:r>
+          </a:p>
+          <a:p>
+            <a:r>
+              <a:rPr lang="en-US" dirty="0"/>
+              <a:t>Pollination ~ colony density + foraging estimates</a:t>
+            </a:r>
+          </a:p>
+          <a:p>
+            <a:endParaRPr lang="en-US" dirty="0"/>
+          </a:p>
+          <a:p>
+            <a:r>
+              <a:rPr lang="en-US" dirty="0"/>
+              <a:t>In this landscape you have XXX colonies producing workers foraging on blueberry—estimate likelihood of foragers from colonies could arrive at blueberries</a:t>
+            </a:r>
+          </a:p>
+          <a:p>
+            <a:pPr lvl="1"/>
+            <a:r>
+              <a:rPr lang="en-US" dirty="0"/>
+              <a:t>Incorporate patch attractiveness into Lonsdorf model? (not necessarily use it—build own model)</a:t>
+            </a:r>
+          </a:p>
+          <a:p>
+            <a:pPr lvl="1"/>
+            <a:r>
+              <a:rPr lang="en-US" dirty="0"/>
+              <a:t>Predictions of colonies across landscape based on observations and previous chapter</a:t>
+            </a:r>
+          </a:p>
+        </p:txBody>
+      </p:sp>
+    </p:spTree>
+    <p:extLst>
+      <p:ext uri="{BB962C8B-B14F-4D97-AF65-F5344CB8AC3E}">
+        <p14:creationId xmlns:p14="http://schemas.microsoft.com/office/powerpoint/2010/main" val="1520187940"/>
+      </p:ext>
+    </p:extLst>
+  </p:cSld>
+  <p:clrMapOvr>
+    <a:masterClrMapping/>
+  </p:clrMapOvr>
+</p:sld>
+</file>
+
+<file path=ppt/slides/slide2.xml><?xml version="1.0" encoding="utf-8"?>
+<p:sld xmlns:a="http://schemas.openxmlformats.org/drawingml/2006/main" xmlns:r="http://schemas.openxmlformats.org/officeDocument/2006/relationships" xmlns:p="http://schemas.openxmlformats.org/presentationml/2006/main">
+  <p:cSld>
+    <p:spTree>
+      <p:nvGrpSpPr>
+        <p:cNvPr id="1" name=""/>
+        <p:cNvGrpSpPr/>
+        <p:nvPr/>
+      </p:nvGrpSpPr>
+      <p:grpSpPr>
+        <a:xfrm>
+          <a:off x="0" y="0"/>
+          <a:ext cx="0" cy="0"/>
+          <a:chOff x="0" y="0"/>
+          <a:chExt cx="0" cy="0"/>
+        </a:xfrm>
+      </p:grpSpPr>
+      <p:sp>
+        <p:nvSpPr>
+          <p:cNvPr id="2" name="Title 1">
+            <a:extLst>
+              <a:ext uri="{FF2B5EF4-FFF2-40B4-BE49-F238E27FC236}">
+                <a16:creationId xmlns:a16="http://schemas.microsoft.com/office/drawing/2014/main" id="{639C8487-A3E6-4774-86D7-C8C731F25A5F}"/>
+              </a:ext>
+            </a:extLst>
+          </p:cNvPr>
+          <p:cNvSpPr>
+            <a:spLocks noGrp="1"/>
+          </p:cNvSpPr>
+          <p:nvPr>
+            <p:ph type="title"/>
+          </p:nvPr>
+        </p:nvSpPr>
+        <p:spPr/>
+        <p:txBody>
+          <a:bodyPr/>
+          <a:lstStyle/>
+          <a:p>
+            <a:r>
+              <a:rPr lang="en-US" dirty="0"/>
+              <a:t>General overview</a:t>
+            </a:r>
+          </a:p>
+        </p:txBody>
+      </p:sp>
+      <p:sp>
+        <p:nvSpPr>
+          <p:cNvPr id="3" name="Content Placeholder 2">
+            <a:extLst>
+              <a:ext uri="{FF2B5EF4-FFF2-40B4-BE49-F238E27FC236}">
+                <a16:creationId xmlns:a16="http://schemas.microsoft.com/office/drawing/2014/main" id="{F24FE626-61EF-B7A6-196E-46A1E8E5FA79}"/>
+              </a:ext>
+            </a:extLst>
+          </p:cNvPr>
+          <p:cNvSpPr>
+            <a:spLocks noGrp="1"/>
+          </p:cNvSpPr>
+          <p:nvPr>
+            <p:ph idx="1"/>
+          </p:nvPr>
+        </p:nvSpPr>
+        <p:spPr/>
+        <p:txBody>
+          <a:bodyPr>
+            <a:normAutofit fontScale="85000" lnSpcReduction="10000"/>
+          </a:bodyPr>
+          <a:lstStyle/>
+          <a:p>
+            <a:r>
+              <a:rPr lang="en-US" b="1" dirty="0"/>
+              <a:t>Lineage turnover </a:t>
+            </a:r>
+            <a:r>
+              <a:rPr lang="en-US" dirty="0"/>
+              <a:t>-- How do landscape characteristics influence the probability of detecting a daughter queen in the following spring?</a:t>
+            </a:r>
+          </a:p>
+          <a:p>
+            <a:r>
+              <a:rPr lang="en-US" b="1" dirty="0"/>
+              <a:t>Allelic turnover</a:t>
+            </a:r>
+            <a:r>
+              <a:rPr lang="en-US" dirty="0"/>
+              <a:t>–how does landscape influence allelic similarity/dissimilarity between year 1 and year 2?</a:t>
+            </a:r>
+          </a:p>
+          <a:p>
+            <a:r>
+              <a:rPr lang="en-US" b="1" dirty="0"/>
+              <a:t>Colony density </a:t>
+            </a:r>
+            <a:r>
+              <a:rPr lang="en-US" dirty="0"/>
+              <a:t>– How do landscape characteristics influence # of detected colonies; Which specific landcover types are associated with more colonies?</a:t>
+            </a:r>
+          </a:p>
+          <a:p>
+            <a:pPr lvl="1"/>
+            <a:r>
+              <a:rPr lang="en-US" dirty="0"/>
+              <a:t>Temporal aspect: accumulation of colonies through season?</a:t>
+            </a:r>
+          </a:p>
+          <a:p>
+            <a:pPr lvl="1"/>
+            <a:endParaRPr lang="en-US" dirty="0"/>
+          </a:p>
+          <a:p>
+            <a:r>
+              <a:rPr lang="en-US" b="1" dirty="0"/>
+              <a:t>Foraging distance-</a:t>
+            </a:r>
+            <a:r>
+              <a:rPr lang="en-US" dirty="0"/>
+              <a:t>–how do species vary in their “baseline” foraging ranges, and do they differ in their “plasticity” in response to floral resources?</a:t>
+            </a:r>
+          </a:p>
+          <a:p>
+            <a:r>
+              <a:rPr lang="en-US" b="1" dirty="0"/>
+              <a:t>Spatial aggregation / abundance of workers </a:t>
+            </a:r>
+            <a:r>
+              <a:rPr lang="en-US" dirty="0"/>
+              <a:t>– coefficient of variation of abundance?</a:t>
+            </a:r>
+          </a:p>
+        </p:txBody>
+      </p:sp>
+    </p:spTree>
+    <p:extLst>
+      <p:ext uri="{BB962C8B-B14F-4D97-AF65-F5344CB8AC3E}">
+        <p14:creationId xmlns:p14="http://schemas.microsoft.com/office/powerpoint/2010/main" val="3589277737"/>
+      </p:ext>
+    </p:extLst>
+  </p:cSld>
+  <p:clrMapOvr>
+    <a:masterClrMapping/>
+  </p:clrMapOvr>
+</p:sld>
+</file>
+
+<file path=ppt/slides/slide3.xml><?xml version="1.0" encoding="utf-8"?>
+<p:sld xmlns:a="http://schemas.openxmlformats.org/drawingml/2006/main" xmlns:r="http://schemas.openxmlformats.org/officeDocument/2006/relationships" xmlns:p="http://schemas.openxmlformats.org/presentationml/2006/main">
+  <p:cSld>
+    <p:spTree>
+      <p:nvGrpSpPr>
+        <p:cNvPr id="1" name=""/>
+        <p:cNvGrpSpPr/>
+        <p:nvPr/>
+      </p:nvGrpSpPr>
+      <p:grpSpPr>
+        <a:xfrm>
+          <a:off x="0" y="0"/>
+          <a:ext cx="0" cy="0"/>
+          <a:chOff x="0" y="0"/>
+          <a:chExt cx="0" cy="0"/>
+        </a:xfrm>
+      </p:grpSpPr>
+      <p:sp>
+        <p:nvSpPr>
+          <p:cNvPr id="2" name="Title 1">
+            <a:extLst>
+              <a:ext uri="{FF2B5EF4-FFF2-40B4-BE49-F238E27FC236}">
+                <a16:creationId xmlns:a16="http://schemas.microsoft.com/office/drawing/2014/main" id="{391CBEFB-EF1F-7195-FA77-B70EE3050846}"/>
+              </a:ext>
+            </a:extLst>
+          </p:cNvPr>
+          <p:cNvSpPr>
+            <a:spLocks noGrp="1"/>
+          </p:cNvSpPr>
+          <p:nvPr>
+            <p:ph type="title"/>
+          </p:nvPr>
+        </p:nvSpPr>
+        <p:spPr/>
+        <p:txBody>
+          <a:bodyPr/>
+          <a:lstStyle/>
+          <a:p>
+            <a:r>
+              <a:rPr lang="en-US" dirty="0"/>
+              <a:t>Foraging distance</a:t>
+            </a:r>
+          </a:p>
+        </p:txBody>
+      </p:sp>
+      <p:sp>
+        <p:nvSpPr>
+          <p:cNvPr id="3" name="Content Placeholder 2">
+            <a:extLst>
+              <a:ext uri="{FF2B5EF4-FFF2-40B4-BE49-F238E27FC236}">
+                <a16:creationId xmlns:a16="http://schemas.microsoft.com/office/drawing/2014/main" id="{9E2A2717-84E3-AA21-07F8-0E56D06A2EB7}"/>
+              </a:ext>
+            </a:extLst>
+          </p:cNvPr>
+          <p:cNvSpPr>
+            <a:spLocks noGrp="1"/>
+          </p:cNvSpPr>
+          <p:nvPr>
+            <p:ph idx="1"/>
+          </p:nvPr>
+        </p:nvSpPr>
+        <p:spPr/>
+        <p:txBody>
+          <a:bodyPr/>
+          <a:lstStyle/>
+          <a:p>
+            <a:r>
+              <a:rPr lang="en-US" dirty="0"/>
+              <a:t>Foraging distance-–how do species vary in their “baseline” foraging ranges, and do they differ in their “plasticity” in response to floral resources?</a:t>
+            </a:r>
+          </a:p>
+          <a:p>
+            <a:r>
+              <a:rPr lang="en-US" dirty="0"/>
+              <a:t>In landscapes with more seminatural vegetation, are resource patches less attractive to foragers (from Pope &amp; Jha 2018) ** might need to do more simulation to validate whether this works</a:t>
+            </a:r>
+          </a:p>
+          <a:p>
+            <a:r>
+              <a:rPr lang="en-US" dirty="0"/>
+              <a:t>Spatial aggregation / abundance of workers – coefficient of variation of abundance?</a:t>
+            </a:r>
+          </a:p>
+          <a:p>
+            <a:endParaRPr lang="en-US" dirty="0"/>
+          </a:p>
+        </p:txBody>
+      </p:sp>
+    </p:spTree>
+    <p:extLst>
+      <p:ext uri="{BB962C8B-B14F-4D97-AF65-F5344CB8AC3E}">
+        <p14:creationId xmlns:p14="http://schemas.microsoft.com/office/powerpoint/2010/main" val="4269190033"/>
+      </p:ext>
+    </p:extLst>
+  </p:cSld>
+  <p:clrMapOvr>
+    <a:masterClrMapping/>
+  </p:clrMapOvr>
+</p:sld>
+</file>
+
+<file path=ppt/slides/slide4.xml><?xml version="1.0" encoding="utf-8"?>
+<p:sld xmlns:a="http://schemas.openxmlformats.org/drawingml/2006/main" xmlns:r="http://schemas.openxmlformats.org/officeDocument/2006/relationships" xmlns:p="http://schemas.openxmlformats.org/presentationml/2006/main">
+  <p:cSld>
+    <p:spTree>
+      <p:nvGrpSpPr>
+        <p:cNvPr id="1" name=""/>
+        <p:cNvGrpSpPr/>
+        <p:nvPr/>
+      </p:nvGrpSpPr>
+      <p:grpSpPr>
+        <a:xfrm>
+          <a:off x="0" y="0"/>
+          <a:ext cx="0" cy="0"/>
+          <a:chOff x="0" y="0"/>
+          <a:chExt cx="0" cy="0"/>
+        </a:xfrm>
+      </p:grpSpPr>
+      <p:sp>
+        <p:nvSpPr>
+          <p:cNvPr id="2" name="Title 1">
+            <a:extLst>
+              <a:ext uri="{FF2B5EF4-FFF2-40B4-BE49-F238E27FC236}">
+                <a16:creationId xmlns:a16="http://schemas.microsoft.com/office/drawing/2014/main" id="{F140850D-437B-E72C-E609-A41FC96C6E68}"/>
+              </a:ext>
+            </a:extLst>
+          </p:cNvPr>
+          <p:cNvSpPr>
+            <a:spLocks noGrp="1"/>
+          </p:cNvSpPr>
+          <p:nvPr>
+            <p:ph type="title"/>
+          </p:nvPr>
+        </p:nvSpPr>
+        <p:spPr/>
+        <p:txBody>
+          <a:bodyPr/>
+          <a:lstStyle/>
+          <a:p>
+            <a:r>
+              <a:rPr lang="en-US" dirty="0"/>
+              <a:t>Lineage turnover</a:t>
+            </a:r>
+          </a:p>
+        </p:txBody>
+      </p:sp>
+      <p:sp>
+        <p:nvSpPr>
+          <p:cNvPr id="3" name="Content Placeholder 2">
+            <a:extLst>
+              <a:ext uri="{FF2B5EF4-FFF2-40B4-BE49-F238E27FC236}">
+                <a16:creationId xmlns:a16="http://schemas.microsoft.com/office/drawing/2014/main" id="{CE155083-58A3-9922-0D96-58F7FE76BD7B}"/>
+              </a:ext>
+            </a:extLst>
+          </p:cNvPr>
+          <p:cNvSpPr>
+            <a:spLocks noGrp="1"/>
+          </p:cNvSpPr>
+          <p:nvPr>
+            <p:ph idx="1"/>
+          </p:nvPr>
+        </p:nvSpPr>
+        <p:spPr/>
+        <p:txBody>
+          <a:bodyPr>
+            <a:normAutofit fontScale="85000" lnSpcReduction="20000"/>
+          </a:bodyPr>
+          <a:lstStyle/>
+          <a:p>
+            <a:r>
+              <a:rPr lang="en-US" dirty="0"/>
+              <a:t>How do landscape characteristics influence the probability of detecting a daughter queen in the following spring?</a:t>
+            </a:r>
+          </a:p>
+          <a:p>
+            <a:endParaRPr lang="en-US" dirty="0"/>
+          </a:p>
+          <a:p>
+            <a:r>
+              <a:rPr lang="en-US" dirty="0"/>
+              <a:t>Model: zero-inflated neg binomial?</a:t>
+            </a:r>
+          </a:p>
+          <a:p>
+            <a:endParaRPr lang="en-US" dirty="0"/>
+          </a:p>
+          <a:p>
+            <a:pPr marL="0" indent="0" algn="ctr">
+              <a:buNone/>
+            </a:pPr>
+            <a:r>
+              <a:rPr lang="en-US" sz="2400" dirty="0"/>
+              <a:t># of queens detected ~ </a:t>
+            </a:r>
+            <a:r>
+              <a:rPr lang="en-US" sz="2400" dirty="0" err="1"/>
+              <a:t>seminatural_area</a:t>
+            </a:r>
+            <a:r>
+              <a:rPr lang="en-US" sz="2400" dirty="0"/>
+              <a:t> + </a:t>
+            </a:r>
+            <a:r>
+              <a:rPr lang="en-US" sz="2400" dirty="0" err="1"/>
+              <a:t>interspersion_index</a:t>
+            </a:r>
+            <a:r>
+              <a:rPr lang="en-US" sz="2400" dirty="0"/>
+              <a:t> + offset</a:t>
+            </a:r>
+          </a:p>
+          <a:p>
+            <a:pPr marL="0" indent="0" algn="ctr">
+              <a:buNone/>
+            </a:pPr>
+            <a:endParaRPr lang="en-US" sz="2400" dirty="0"/>
+          </a:p>
+          <a:p>
+            <a:pPr marL="0" indent="0" algn="ctr">
+              <a:buNone/>
+            </a:pPr>
+            <a:r>
+              <a:rPr lang="en-US" sz="2400" dirty="0"/>
+              <a:t>offset = # of colonies observed at that site in the previous year?</a:t>
+            </a:r>
+          </a:p>
+          <a:p>
+            <a:pPr marL="0" indent="0" algn="ctr">
+              <a:buNone/>
+            </a:pPr>
+            <a:r>
+              <a:rPr lang="en-US" sz="2400" dirty="0"/>
+              <a:t>site level or transect level?</a:t>
+            </a:r>
+          </a:p>
+          <a:p>
+            <a:pPr marL="0" indent="0" algn="ctr">
+              <a:buNone/>
+            </a:pPr>
+            <a:endParaRPr lang="en-US" sz="2400" dirty="0"/>
+          </a:p>
+          <a:p>
+            <a:pPr marL="0" indent="0" algn="ctr">
+              <a:buNone/>
+            </a:pPr>
+            <a:r>
+              <a:rPr lang="en-US" sz="2400" dirty="0"/>
+              <a:t>Impatiens queens recaptures: W (22), SD (1), ED (7), NR (8), PM (4), HR(12)</a:t>
+            </a:r>
+          </a:p>
+          <a:p>
+            <a:pPr marL="0" indent="0" algn="ctr">
+              <a:buNone/>
+            </a:pPr>
+            <a:r>
+              <a:rPr lang="en-US" sz="2400" dirty="0" err="1"/>
+              <a:t>Mixtus</a:t>
+            </a:r>
+            <a:r>
+              <a:rPr lang="en-US" sz="2400" dirty="0"/>
+              <a:t> queens recaptures: W (4), SD (0), ED (0), NR (0), PM (1), HR(0)</a:t>
+            </a:r>
+          </a:p>
+          <a:p>
+            <a:pPr marL="0" indent="0" algn="ctr">
+              <a:buNone/>
+            </a:pPr>
+            <a:endParaRPr lang="en-US" sz="2400" dirty="0"/>
+          </a:p>
+        </p:txBody>
+      </p:sp>
+    </p:spTree>
+    <p:extLst>
+      <p:ext uri="{BB962C8B-B14F-4D97-AF65-F5344CB8AC3E}">
+        <p14:creationId xmlns:p14="http://schemas.microsoft.com/office/powerpoint/2010/main" val="4169594659"/>
+      </p:ext>
+    </p:extLst>
+  </p:cSld>
+  <p:clrMapOvr>
+    <a:masterClrMapping/>
+  </p:clrMapOvr>
+</p:sld>
+</file>
+
+<file path=ppt/slides/slide5.xml><?xml version="1.0" encoding="utf-8"?>
+<p:sld xmlns:a="http://schemas.openxmlformats.org/drawingml/2006/main" xmlns:r="http://schemas.openxmlformats.org/officeDocument/2006/relationships" xmlns:p="http://schemas.openxmlformats.org/presentationml/2006/main" show="0">
+  <p:cSld>
+    <p:spTree>
+      <p:nvGrpSpPr>
+        <p:cNvPr id="1" name=""/>
+        <p:cNvGrpSpPr/>
+        <p:nvPr/>
+      </p:nvGrpSpPr>
+      <p:grpSpPr>
+        <a:xfrm>
+          <a:off x="0" y="0"/>
+          <a:ext cx="0" cy="0"/>
+          <a:chOff x="0" y="0"/>
+          <a:chExt cx="0" cy="0"/>
+        </a:xfrm>
+      </p:grpSpPr>
+      <p:sp>
+        <p:nvSpPr>
+          <p:cNvPr id="2" name="Title 1">
+            <a:extLst>
+              <a:ext uri="{FF2B5EF4-FFF2-40B4-BE49-F238E27FC236}">
+                <a16:creationId xmlns:a16="http://schemas.microsoft.com/office/drawing/2014/main" id="{01035C16-5BD0-8A1C-ED80-9E8CFF49D29D}"/>
+              </a:ext>
+            </a:extLst>
+          </p:cNvPr>
+          <p:cNvSpPr>
+            <a:spLocks noGrp="1"/>
+          </p:cNvSpPr>
+          <p:nvPr>
+            <p:ph type="title"/>
+          </p:nvPr>
+        </p:nvSpPr>
+        <p:spPr/>
+        <p:txBody>
+          <a:bodyPr/>
+          <a:lstStyle/>
+          <a:p>
+            <a:r>
+              <a:rPr lang="en-US" dirty="0"/>
+              <a:t>Allelic turnover</a:t>
+            </a:r>
+          </a:p>
+        </p:txBody>
+      </p:sp>
+      <p:sp>
+        <p:nvSpPr>
+          <p:cNvPr id="3" name="Content Placeholder 2">
+            <a:extLst>
+              <a:ext uri="{FF2B5EF4-FFF2-40B4-BE49-F238E27FC236}">
+                <a16:creationId xmlns:a16="http://schemas.microsoft.com/office/drawing/2014/main" id="{0DCFBE56-E8D6-ADD3-40D7-C6AAE620DBF8}"/>
+              </a:ext>
+            </a:extLst>
+          </p:cNvPr>
+          <p:cNvSpPr>
+            <a:spLocks noGrp="1"/>
+          </p:cNvSpPr>
+          <p:nvPr>
+            <p:ph idx="1"/>
+          </p:nvPr>
+        </p:nvSpPr>
+        <p:spPr/>
+        <p:txBody>
+          <a:bodyPr/>
+          <a:lstStyle/>
+          <a:p>
+            <a:r>
+              <a:rPr lang="en-US" dirty="0"/>
+              <a:t>Calculate a dis-similarity metric between years for each transect?</a:t>
+            </a:r>
+          </a:p>
+          <a:p>
+            <a:endParaRPr lang="en-US" dirty="0"/>
+          </a:p>
+          <a:p>
+            <a:pPr marL="0" indent="0">
+              <a:buNone/>
+            </a:pPr>
+            <a:r>
+              <a:rPr lang="en-US" dirty="0"/>
+              <a:t>Allelic dissimilarity ~ </a:t>
+            </a:r>
+            <a:r>
+              <a:rPr lang="en-US" dirty="0" err="1"/>
+              <a:t>seminatural_area</a:t>
+            </a:r>
+            <a:r>
+              <a:rPr lang="en-US" dirty="0"/>
+              <a:t> + </a:t>
+            </a:r>
+            <a:r>
+              <a:rPr lang="en-US" dirty="0" err="1"/>
+              <a:t>interspersion_index</a:t>
+            </a:r>
+            <a:r>
+              <a:rPr lang="en-US" dirty="0"/>
+              <a:t> </a:t>
+            </a:r>
+          </a:p>
+          <a:p>
+            <a:pPr marL="0" indent="0">
+              <a:buNone/>
+            </a:pPr>
+            <a:endParaRPr lang="en-US" dirty="0"/>
+          </a:p>
+          <a:p>
+            <a:r>
+              <a:rPr lang="en-US" dirty="0"/>
+              <a:t>Or maybe better to do a null model/permutational approach—accounting for total number of observations at each location per year</a:t>
+            </a:r>
+          </a:p>
+        </p:txBody>
+      </p:sp>
+    </p:spTree>
+    <p:extLst>
+      <p:ext uri="{BB962C8B-B14F-4D97-AF65-F5344CB8AC3E}">
+        <p14:creationId xmlns:p14="http://schemas.microsoft.com/office/powerpoint/2010/main" val="1237083577"/>
+      </p:ext>
+    </p:extLst>
+  </p:cSld>
+  <p:clrMapOvr>
+    <a:masterClrMapping/>
+  </p:clrMapOvr>
+</p:sld>
+</file>
+
+<file path=ppt/slides/slide6.xml><?xml version="1.0" encoding="utf-8"?>
+<p:sld xmlns:a="http://schemas.openxmlformats.org/drawingml/2006/main" xmlns:r="http://schemas.openxmlformats.org/officeDocument/2006/relationships" xmlns:p="http://schemas.openxmlformats.org/presentationml/2006/main">
+  <p:cSld>
+    <p:spTree>
+      <p:nvGrpSpPr>
+        <p:cNvPr id="1" name=""/>
+        <p:cNvGrpSpPr/>
+        <p:nvPr/>
+      </p:nvGrpSpPr>
+      <p:grpSpPr>
+        <a:xfrm>
+          <a:off x="0" y="0"/>
+          <a:ext cx="0" cy="0"/>
+          <a:chOff x="0" y="0"/>
+          <a:chExt cx="0" cy="0"/>
+        </a:xfrm>
+      </p:grpSpPr>
+      <p:sp>
+        <p:nvSpPr>
+          <p:cNvPr id="2" name="Title 1">
+            <a:extLst>
+              <a:ext uri="{FF2B5EF4-FFF2-40B4-BE49-F238E27FC236}">
+                <a16:creationId xmlns:a16="http://schemas.microsoft.com/office/drawing/2014/main" id="{2EAD2895-3113-E459-CD7D-FFB971CF63CB}"/>
+              </a:ext>
+            </a:extLst>
+          </p:cNvPr>
+          <p:cNvSpPr>
+            <a:spLocks noGrp="1"/>
+          </p:cNvSpPr>
+          <p:nvPr>
+            <p:ph type="title"/>
+          </p:nvPr>
+        </p:nvSpPr>
+        <p:spPr/>
+        <p:txBody>
+          <a:bodyPr/>
+          <a:lstStyle/>
+          <a:p>
+            <a:r>
+              <a:rPr lang="en-US" dirty="0"/>
+              <a:t>Colony density</a:t>
+            </a:r>
+          </a:p>
+        </p:txBody>
+      </p:sp>
+      <p:sp>
+        <p:nvSpPr>
+          <p:cNvPr id="3" name="Content Placeholder 2">
+            <a:extLst>
+              <a:ext uri="{FF2B5EF4-FFF2-40B4-BE49-F238E27FC236}">
+                <a16:creationId xmlns:a16="http://schemas.microsoft.com/office/drawing/2014/main" id="{9FC24658-1BE2-F838-F7FF-775CA2B07FAD}"/>
+              </a:ext>
+            </a:extLst>
+          </p:cNvPr>
+          <p:cNvSpPr>
+            <a:spLocks noGrp="1"/>
+          </p:cNvSpPr>
+          <p:nvPr>
+            <p:ph idx="1"/>
+          </p:nvPr>
+        </p:nvSpPr>
+        <p:spPr>
+          <a:xfrm>
+            <a:off x="210069" y="1825625"/>
+            <a:ext cx="11850130" cy="4351338"/>
+          </a:xfrm>
+        </p:spPr>
+        <p:txBody>
+          <a:bodyPr>
+            <a:normAutofit/>
+          </a:bodyPr>
+          <a:lstStyle/>
+          <a:p>
+            <a:r>
+              <a:rPr lang="en-US" dirty="0"/>
+              <a:t>Which specific landcover types are associated with more colonies?</a:t>
+            </a:r>
+          </a:p>
+          <a:p>
+            <a:pPr lvl="1"/>
+            <a:r>
+              <a:rPr lang="en-US" dirty="0"/>
+              <a:t>Differential abundance analysis? Not totally sure how to do this but could read some papers</a:t>
+            </a:r>
+          </a:p>
+          <a:p>
+            <a:pPr lvl="1"/>
+            <a:endParaRPr lang="en-US" dirty="0"/>
+          </a:p>
+          <a:p>
+            <a:r>
+              <a:rPr lang="en-US" dirty="0"/>
+              <a:t>How do landscape characteristics influence # of detected colonies?</a:t>
+            </a:r>
+          </a:p>
+          <a:p>
+            <a:endParaRPr lang="en-US" sz="2600" dirty="0"/>
+          </a:p>
+          <a:p>
+            <a:r>
+              <a:rPr lang="en-US" dirty="0"/>
+              <a:t>Temporal aspect: accumulation of colonies through season?</a:t>
+            </a:r>
+          </a:p>
+          <a:p>
+            <a:endParaRPr lang="en-US" dirty="0"/>
+          </a:p>
+        </p:txBody>
+      </p:sp>
+    </p:spTree>
+    <p:extLst>
+      <p:ext uri="{BB962C8B-B14F-4D97-AF65-F5344CB8AC3E}">
+        <p14:creationId xmlns:p14="http://schemas.microsoft.com/office/powerpoint/2010/main" val="3069418217"/>
+      </p:ext>
+    </p:extLst>
+  </p:cSld>
+  <p:clrMapOvr>
+    <a:masterClrMapping/>
+  </p:clrMapOvr>
+</p:sld>
+</file>
+
+<file path=ppt/slides/slide7.xml><?xml version="1.0" encoding="utf-8"?>
+<p:sld xmlns:a="http://schemas.openxmlformats.org/drawingml/2006/main" xmlns:r="http://schemas.openxmlformats.org/officeDocument/2006/relationships" xmlns:p="http://schemas.openxmlformats.org/presentationml/2006/main">
+  <p:cSld>
+    <p:spTree>
+      <p:nvGrpSpPr>
+        <p:cNvPr id="1" name=""/>
+        <p:cNvGrpSpPr/>
+        <p:nvPr/>
+      </p:nvGrpSpPr>
+      <p:grpSpPr>
+        <a:xfrm>
+          <a:off x="0" y="0"/>
+          <a:ext cx="0" cy="0"/>
+          <a:chOff x="0" y="0"/>
+          <a:chExt cx="0" cy="0"/>
+        </a:xfrm>
+      </p:grpSpPr>
+      <p:sp>
+        <p:nvSpPr>
+          <p:cNvPr id="2" name="Title 1">
+            <a:extLst>
+              <a:ext uri="{FF2B5EF4-FFF2-40B4-BE49-F238E27FC236}">
+                <a16:creationId xmlns:a16="http://schemas.microsoft.com/office/drawing/2014/main" id="{B521A283-D7BA-2A3A-80FD-E51655E54405}"/>
+              </a:ext>
+            </a:extLst>
+          </p:cNvPr>
+          <p:cNvSpPr>
+            <a:spLocks noGrp="1"/>
+          </p:cNvSpPr>
+          <p:nvPr>
+            <p:ph type="title"/>
+          </p:nvPr>
+        </p:nvSpPr>
+        <p:spPr/>
+        <p:txBody>
+          <a:bodyPr/>
+          <a:lstStyle/>
+          <a:p>
+            <a:r>
+              <a:rPr lang="en-US" dirty="0"/>
+              <a:t>associating specific landcover types with colony density</a:t>
+            </a:r>
+          </a:p>
+        </p:txBody>
+      </p:sp>
+      <p:pic>
+        <p:nvPicPr>
+          <p:cNvPr id="5" name="Picture 4" descr="A graph with numbers and a number of berries&#10;&#10;AI-generated content may be incorrect.">
+            <a:extLst>
+              <a:ext uri="{FF2B5EF4-FFF2-40B4-BE49-F238E27FC236}">
+                <a16:creationId xmlns:a16="http://schemas.microsoft.com/office/drawing/2014/main" id="{4D5F0BB0-1884-5606-6070-767F8CD0B689}"/>
+              </a:ext>
+            </a:extLst>
+          </p:cNvPr>
+          <p:cNvPicPr>
+            <a:picLocks noChangeAspect="1"/>
+          </p:cNvPicPr>
+          <p:nvPr/>
+        </p:nvPicPr>
+        <p:blipFill>
+          <a:blip r:embed="rId2"/>
+          <a:stretch>
+            <a:fillRect/>
+          </a:stretch>
+        </p:blipFill>
+        <p:spPr>
+          <a:xfrm>
+            <a:off x="1497767" y="1933731"/>
+            <a:ext cx="9433512" cy="4921832"/>
+          </a:xfrm>
+          <a:prstGeom prst="rect">
+            <a:avLst/>
+          </a:prstGeom>
+        </p:spPr>
+      </p:pic>
+    </p:spTree>
+    <p:extLst>
+      <p:ext uri="{BB962C8B-B14F-4D97-AF65-F5344CB8AC3E}">
+        <p14:creationId xmlns:p14="http://schemas.microsoft.com/office/powerpoint/2010/main" val="2830814469"/>
+      </p:ext>
+    </p:extLst>
+  </p:cSld>
+  <p:clrMapOvr>
+    <a:masterClrMapping/>
+  </p:clrMapOvr>
+</p:sld>
+</file>
+
 <file path=ppt/slides/slide8.xml><?xml version="1.0" encoding="utf-8"?>
 <p:sld xmlns:a="http://schemas.openxmlformats.org/drawingml/2006/main" xmlns:r="http://schemas.openxmlformats.org/officeDocument/2006/relationships" xmlns:p="http://schemas.openxmlformats.org/presentationml/2006/main">
   <p:cSld>
@@ -5024,7 +6334,7 @@
           <p:cNvPr id="2" name="Title 1">
             <a:extLst>
               <a:ext uri="{FF2B5EF4-FFF2-40B4-BE49-F238E27FC236}">
-                <a16:creationId xmlns:a16="http://schemas.microsoft.com/office/drawing/2014/main" id="{E6941D5D-3F5F-C4A0-45DF-4D2002A5DEAB}"/>
+                <a16:creationId xmlns:a16="http://schemas.microsoft.com/office/drawing/2014/main" id="{243412B7-4985-79CA-B7D4-A71D6CE36479}"/>
               </a:ext>
             </a:extLst>
           </p:cNvPr>
@@ -5042,7 +6352,7 @@
           <a:p>
             <a:r>
               <a:rPr lang="en-US" dirty="0"/>
-              <a:t>Foraging / Nest Density Framing</a:t>
+              <a:t>possible models</a:t>
             </a:r>
           </a:p>
         </p:txBody>
@@ -5052,7 +6362,7 @@
           <p:cNvPr id="3" name="Content Placeholder 2">
             <a:extLst>
               <a:ext uri="{FF2B5EF4-FFF2-40B4-BE49-F238E27FC236}">
-                <a16:creationId xmlns:a16="http://schemas.microsoft.com/office/drawing/2014/main" id="{2065FB76-89D1-D545-80F2-A105221032A4}"/>
+                <a16:creationId xmlns:a16="http://schemas.microsoft.com/office/drawing/2014/main" id="{62AC3AB2-0831-F41D-9B4F-7B0FC6B4CDF8}"/>
               </a:ext>
             </a:extLst>
           </p:cNvPr>
@@ -5065,133 +6375,26 @@
         </p:nvSpPr>
         <p:spPr/>
         <p:txBody>
-          <a:bodyPr>
-            <a:normAutofit fontScale="85000" lnSpcReduction="20000"/>
-          </a:bodyPr>
-          <a:lstStyle/>
-          <a:p>
-            <a:pPr marL="514350" indent="-514350">
-              <a:buAutoNum type="arabicParenBoth"/>
+          <a:bodyPr/>
+          <a:lstStyle/>
+          <a:p>
+            <a:pPr>
+              <a:buFontTx/>
+              <a:buChar char="-"/>
             </a:pPr>
             <a:r>
               <a:rPr lang="en-US" dirty="0"/>
-              <a:t>Bees are important</a:t>
-            </a:r>
-          </a:p>
-          <a:p>
-            <a:pPr marL="514350" indent="-514350">
-              <a:buAutoNum type="arabicParenBoth"/>
+              <a:t>Throw all nest-habitable landcover classes (blackberry, urban, hedgerow, low edge, forest, cranberry, blueberry, hay, fallow, perennial, wetland) into a model and see what the multicollinearity looks like?</a:t>
+            </a:r>
+          </a:p>
+          <a:p>
+            <a:pPr>
+              <a:buFontTx/>
+              <a:buChar char="-"/>
             </a:pPr>
             <a:r>
               <a:rPr lang="en-US" dirty="0"/>
-              <a:t>Ag intensification leads to fragmentation of seminatural veg + nesting habitat</a:t>
-            </a:r>
-          </a:p>
-          <a:p>
-            <a:pPr marL="514350" indent="-514350">
-              <a:buAutoNum type="arabicParenBoth"/>
-            </a:pPr>
-            <a:r>
-              <a:rPr lang="en-US" dirty="0"/>
-              <a:t>Bumblebees vary in nesting preferences, foraging distance, phenology, food plant </a:t>
-            </a:r>
-            <a:r>
-              <a:rPr lang="en-US" dirty="0" err="1"/>
-              <a:t>prefs</a:t>
-            </a:r>
-            <a:endParaRPr lang="en-US" dirty="0"/>
-          </a:p>
-          <a:p>
-            <a:pPr marL="514350" indent="-514350">
-              <a:buAutoNum type="arabicParenBoth"/>
-            </a:pPr>
-            <a:r>
-              <a:rPr lang="en-US" dirty="0"/>
-              <a:t>The interaction of </a:t>
-            </a:r>
-            <a:r>
-              <a:rPr lang="en-US" dirty="0" err="1"/>
-              <a:t>spp</a:t>
-            </a:r>
-            <a:r>
-              <a:rPr lang="en-US" dirty="0"/>
-              <a:t> traits with biotic/abiotic conditions influences </a:t>
-            </a:r>
-            <a:r>
-              <a:rPr lang="en-US" dirty="0" err="1"/>
-              <a:t>spp</a:t>
-            </a:r>
-            <a:r>
-              <a:rPr lang="en-US" dirty="0"/>
-              <a:t> response to land use intensification</a:t>
-            </a:r>
-          </a:p>
-          <a:p>
-            <a:pPr marL="514350" indent="-514350">
-              <a:buAutoNum type="arabicParenBoth"/>
-            </a:pPr>
-            <a:r>
-              <a:rPr lang="en-US" dirty="0"/>
-              <a:t>Questions:</a:t>
-            </a:r>
-          </a:p>
-          <a:p>
-            <a:pPr marL="971550" lvl="1" indent="-514350">
-              <a:buAutoNum type="arabicParenBoth"/>
-            </a:pPr>
-            <a:r>
-              <a:rPr lang="en-US" dirty="0"/>
-              <a:t>How does foraging distance vary between </a:t>
-            </a:r>
-            <a:r>
-              <a:rPr lang="en-US" dirty="0" err="1"/>
-              <a:t>spp</a:t>
-            </a:r>
-            <a:r>
-              <a:rPr lang="en-US" dirty="0"/>
-              <a:t>, and to what degree do high quality or abundance floral resources </a:t>
-            </a:r>
-            <a:r>
-              <a:rPr lang="en-US" i="1" dirty="0"/>
-              <a:t>drive </a:t>
-            </a:r>
-            <a:r>
-              <a:rPr lang="en-US" dirty="0"/>
-              <a:t>this difference?</a:t>
-            </a:r>
-          </a:p>
-          <a:p>
-            <a:pPr marL="971550" lvl="1" indent="-514350">
-              <a:buAutoNum type="arabicParenBoth"/>
-            </a:pPr>
-            <a:r>
-              <a:rPr lang="en-US" dirty="0"/>
-              <a:t>Do species have different land use type association </a:t>
-            </a:r>
-            <a:r>
-              <a:rPr lang="en-US" dirty="0" err="1"/>
-              <a:t>wrt</a:t>
-            </a:r>
-            <a:r>
-              <a:rPr lang="en-US" dirty="0"/>
-              <a:t> colony density or nest searching?</a:t>
-            </a:r>
-          </a:p>
-          <a:p>
-            <a:pPr marL="971550" lvl="1" indent="-514350">
-              <a:buAutoNum type="arabicParenBoth"/>
-            </a:pPr>
-            <a:r>
-              <a:rPr lang="en-US" dirty="0"/>
-              <a:t>At what rate do we observe daughter queen in the following year? Is this different for different </a:t>
-            </a:r>
-            <a:r>
-              <a:rPr lang="en-US" dirty="0" err="1"/>
-              <a:t>spp</a:t>
-            </a:r>
-            <a:r>
-              <a:rPr lang="en-US" dirty="0"/>
-              <a:t>?</a:t>
+              <a:t>NMDS (or similar graphical representation?) of landcover “composition”</a:t>
             </a:r>
           </a:p>
         </p:txBody>
@@ -5199,7 +6402,7 @@
     </p:spTree>
     <p:extLst>
       <p:ext uri="{BB962C8B-B14F-4D97-AF65-F5344CB8AC3E}">
-        <p14:creationId xmlns:p14="http://schemas.microsoft.com/office/powerpoint/2010/main" val="3879349738"/>
+        <p14:creationId xmlns:p14="http://schemas.microsoft.com/office/powerpoint/2010/main" val="2381227393"/>
       </p:ext>
     </p:extLst>
   </p:cSld>
@@ -5231,7 +6434,7 @@
           <p:cNvPr id="2" name="Title 1">
             <a:extLst>
               <a:ext uri="{FF2B5EF4-FFF2-40B4-BE49-F238E27FC236}">
-                <a16:creationId xmlns:a16="http://schemas.microsoft.com/office/drawing/2014/main" id="{F9BE05C7-78FC-AB53-A801-AC4AC5974AD1}"/>
+                <a16:creationId xmlns:a16="http://schemas.microsoft.com/office/drawing/2014/main" id="{610588A3-92BC-42B2-7822-97D721C35DAE}"/>
               </a:ext>
             </a:extLst>
           </p:cNvPr>
@@ -5242,79 +6445,127 @@
             <p:ph type="title"/>
           </p:nvPr>
         </p:nvSpPr>
-        <p:spPr/>
-        <p:txBody>
-          <a:bodyPr/>
-          <a:lstStyle/>
-          <a:p>
-            <a:r>
-              <a:rPr lang="en-US" dirty="0"/>
-              <a:t>Foraging</a:t>
-            </a:r>
-          </a:p>
-        </p:txBody>
-      </p:sp>
-      <p:sp>
-        <p:nvSpPr>
-          <p:cNvPr id="3" name="Content Placeholder 2">
-            <a:extLst>
-              <a:ext uri="{FF2B5EF4-FFF2-40B4-BE49-F238E27FC236}">
-                <a16:creationId xmlns:a16="http://schemas.microsoft.com/office/drawing/2014/main" id="{926B92B6-2CAD-2A83-BDFE-223DAA40C0CF}"/>
-              </a:ext>
-            </a:extLst>
-          </p:cNvPr>
-          <p:cNvSpPr>
-            <a:spLocks noGrp="1"/>
-          </p:cNvSpPr>
-          <p:nvPr>
-            <p:ph idx="1"/>
-          </p:nvPr>
-        </p:nvSpPr>
-        <p:spPr/>
+        <p:spPr>
+          <a:xfrm>
+            <a:off x="227455" y="304800"/>
+            <a:ext cx="4586990" cy="1730293"/>
+          </a:xfrm>
+        </p:spPr>
         <p:txBody>
           <a:bodyPr>
-            <a:normAutofit lnSpcReduction="10000"/>
+            <a:normAutofit/>
           </a:bodyPr>
           <a:lstStyle/>
           <a:p>
             <a:r>
-              <a:rPr lang="en-US" dirty="0"/>
-              <a:t>Foraging in relation to pollination services</a:t>
-            </a:r>
-          </a:p>
-          <a:p>
-            <a:r>
-              <a:rPr lang="en-US" dirty="0"/>
-              <a:t>Estimate parameters for patch attractiveness</a:t>
-            </a:r>
-          </a:p>
-          <a:p>
-            <a:r>
-              <a:rPr lang="en-US" dirty="0"/>
-              <a:t>Pollination ~ colony density + foraging estimates</a:t>
-            </a:r>
-          </a:p>
-          <a:p>
-            <a:endParaRPr lang="en-US" dirty="0"/>
-          </a:p>
-          <a:p>
-            <a:r>
-              <a:rPr lang="en-US" dirty="0"/>
-              <a:t>In this landscape you have XXX colonies producing workers foraging on blueberry—estimate likelihood of foragers from colonies could arrive at blueberries</a:t>
-            </a:r>
-          </a:p>
-          <a:p>
-            <a:pPr lvl="1"/>
-            <a:r>
-              <a:rPr lang="en-US" dirty="0"/>
-              <a:t>Incorporate patch attractiveness into Lonsdorf model? (not necessarily use it—build own model)</a:t>
-            </a:r>
-          </a:p>
-          <a:p>
-            <a:pPr lvl="1"/>
-            <a:r>
-              <a:rPr lang="en-US" dirty="0"/>
-              <a:t>Predictions of colonies across landscape based on observations and previous chapter</a:t>
+              <a:rPr lang="en-US" sz="3600" dirty="0"/>
+              <a:t>correlation between number of workers &amp; number of colonies</a:t>
+            </a:r>
+          </a:p>
+        </p:txBody>
+      </p:sp>
+      <p:pic>
+        <p:nvPicPr>
+          <p:cNvPr id="5" name="Picture 4" descr="A graph of different colored dots&#10;&#10;AI-generated content may be incorrect.">
+            <a:extLst>
+              <a:ext uri="{FF2B5EF4-FFF2-40B4-BE49-F238E27FC236}">
+                <a16:creationId xmlns:a16="http://schemas.microsoft.com/office/drawing/2014/main" id="{43156027-DD8F-E869-23FB-37A1D6619838}"/>
+              </a:ext>
+            </a:extLst>
+          </p:cNvPr>
+          <p:cNvPicPr>
+            <a:picLocks noChangeAspect="1"/>
+          </p:cNvPicPr>
+          <p:nvPr/>
+        </p:nvPicPr>
+        <p:blipFill>
+          <a:blip r:embed="rId2"/>
+          <a:stretch>
+            <a:fillRect/>
+          </a:stretch>
+        </p:blipFill>
+        <p:spPr>
+          <a:xfrm>
+            <a:off x="4814445" y="304800"/>
+            <a:ext cx="7150100" cy="6248400"/>
+          </a:xfrm>
+          <a:prstGeom prst="rect">
+            <a:avLst/>
+          </a:prstGeom>
+        </p:spPr>
+      </p:pic>
+      <p:sp>
+        <p:nvSpPr>
+          <p:cNvPr id="6" name="TextBox 5">
+            <a:extLst>
+              <a:ext uri="{FF2B5EF4-FFF2-40B4-BE49-F238E27FC236}">
+                <a16:creationId xmlns:a16="http://schemas.microsoft.com/office/drawing/2014/main" id="{CD739CAF-27AC-6930-EFFE-E051EFB05193}"/>
+              </a:ext>
+            </a:extLst>
+          </p:cNvPr>
+          <p:cNvSpPr txBox="1"/>
+          <p:nvPr/>
+        </p:nvSpPr>
+        <p:spPr>
+          <a:xfrm>
+            <a:off x="227456" y="2416629"/>
+            <a:ext cx="4197588" cy="923330"/>
+          </a:xfrm>
+          <a:prstGeom prst="rect">
+            <a:avLst/>
+          </a:prstGeom>
+          <a:noFill/>
+        </p:spPr>
+        <p:txBody>
+          <a:bodyPr wrap="square" rtlCol="0">
+            <a:spAutoFit/>
+          </a:bodyPr>
+          <a:lstStyle/>
+          <a:p>
+            <a:r>
+              <a:rPr lang="en-US" dirty="0"/>
+              <a:t>This is at the transect level—so some colonies are being observed at multiple transects</a:t>
+            </a:r>
+          </a:p>
+        </p:txBody>
+      </p:sp>
+      <p:sp>
+        <p:nvSpPr>
+          <p:cNvPr id="7" name="TextBox 6">
+            <a:extLst>
+              <a:ext uri="{FF2B5EF4-FFF2-40B4-BE49-F238E27FC236}">
+                <a16:creationId xmlns:a16="http://schemas.microsoft.com/office/drawing/2014/main" id="{8A12405F-9184-2285-EFF0-26FDA301D0ED}"/>
+              </a:ext>
+            </a:extLst>
+          </p:cNvPr>
+          <p:cNvSpPr txBox="1"/>
+          <p:nvPr/>
+        </p:nvSpPr>
+        <p:spPr>
+          <a:xfrm>
+            <a:off x="261257" y="3902528"/>
+            <a:ext cx="4343400" cy="923330"/>
+          </a:xfrm>
+          <a:prstGeom prst="rect">
+            <a:avLst/>
+          </a:prstGeom>
+          <a:noFill/>
+        </p:spPr>
+        <p:txBody>
+          <a:bodyPr wrap="square" rtlCol="0">
+            <a:spAutoFit/>
+          </a:bodyPr>
+          <a:lstStyle/>
+          <a:p>
+            <a:r>
+              <a:rPr lang="en-US" dirty="0"/>
+              <a:t>Not sure if it makes more sense to do this at site level?</a:t>
+            </a:r>
+          </a:p>
+          <a:p>
+            <a:r>
+              <a:rPr lang="en-US" dirty="0"/>
+              <a:t>But only 6 sites</a:t>
             </a:r>
           </a:p>
         </p:txBody>
@@ -5322,7 +6573,7 @@
     </p:spTree>
     <p:extLst>
       <p:ext uri="{BB962C8B-B14F-4D97-AF65-F5344CB8AC3E}">
-        <p14:creationId xmlns:p14="http://schemas.microsoft.com/office/powerpoint/2010/main" val="1520187940"/>
+        <p14:creationId xmlns:p14="http://schemas.microsoft.com/office/powerpoint/2010/main" val="134058014"/>
       </p:ext>
     </p:extLst>
   </p:cSld>

</xml_diff>

<commit_message>
trying to fit foraging dist model--max tree depth error
</commit_message>
<xml_diff>
--- a/docs/storyboard.pptx
+++ b/docs/storyboard.pptx
@@ -5,7 +5,7 @@
     <p:sldMasterId id="2147483648" r:id="rId1"/>
   </p:sldMasterIdLst>
   <p:notesMasterIdLst>
-    <p:notesMasterId r:id="rId18"/>
+    <p:notesMasterId r:id="rId19"/>
   </p:notesMasterIdLst>
   <p:sldIdLst>
     <p:sldId id="256" r:id="rId2"/>
@@ -22,8 +22,9 @@
     <p:sldId id="269" r:id="rId13"/>
     <p:sldId id="270" r:id="rId14"/>
     <p:sldId id="262" r:id="rId15"/>
-    <p:sldId id="258" r:id="rId16"/>
-    <p:sldId id="264" r:id="rId17"/>
+    <p:sldId id="272" r:id="rId16"/>
+    <p:sldId id="258" r:id="rId17"/>
+    <p:sldId id="264" r:id="rId18"/>
   </p:sldIdLst>
   <p:sldSz cx="12192000" cy="6858000"/>
   <p:notesSz cx="6858000" cy="9144000"/>
@@ -212,7 +213,7 @@
           <a:p>
             <a:fld id="{05D2B1B1-D9EE-9441-950D-C823E2B17417}" type="datetimeFigureOut">
               <a:rPr lang="en-US" smtClean="0"/>
-              <a:t>10/29/25</a:t>
+              <a:t>11/18/25</a:t>
             </a:fld>
             <a:endParaRPr lang="en-US"/>
           </a:p>
@@ -566,6 +567,126 @@
 </p:notes>
 </file>
 
+<file path=ppt/notesSlides/notesSlide2.xml><?xml version="1.0" encoding="utf-8"?>
+<p:notes xmlns:a="http://schemas.openxmlformats.org/drawingml/2006/main" xmlns:r="http://schemas.openxmlformats.org/officeDocument/2006/relationships" xmlns:p="http://schemas.openxmlformats.org/presentationml/2006/main">
+  <p:cSld>
+    <p:spTree>
+      <p:nvGrpSpPr>
+        <p:cNvPr id="1" name=""/>
+        <p:cNvGrpSpPr/>
+        <p:nvPr/>
+      </p:nvGrpSpPr>
+      <p:grpSpPr>
+        <a:xfrm>
+          <a:off x="0" y="0"/>
+          <a:ext cx="0" cy="0"/>
+          <a:chOff x="0" y="0"/>
+          <a:chExt cx="0" cy="0"/>
+        </a:xfrm>
+      </p:grpSpPr>
+      <p:sp>
+        <p:nvSpPr>
+          <p:cNvPr id="2" name="Slide Image Placeholder 1"/>
+          <p:cNvSpPr>
+            <a:spLocks noGrp="1" noRot="1" noChangeAspect="1"/>
+          </p:cNvSpPr>
+          <p:nvPr>
+            <p:ph type="sldImg"/>
+          </p:nvPr>
+        </p:nvSpPr>
+        <p:spPr/>
+      </p:sp>
+      <p:sp>
+        <p:nvSpPr>
+          <p:cNvPr id="3" name="Notes Placeholder 2"/>
+          <p:cNvSpPr>
+            <a:spLocks noGrp="1"/>
+          </p:cNvSpPr>
+          <p:nvPr>
+            <p:ph type="body" idx="1"/>
+          </p:nvPr>
+        </p:nvSpPr>
+        <p:spPr/>
+        <p:txBody>
+          <a:bodyPr/>
+          <a:lstStyle/>
+          <a:p>
+            <a:r>
+              <a:rPr lang="en-US" dirty="0"/>
+              <a:t>High colony density estimates result in landscape with a high proportion of singleton colonies. [[CALCULATE SINGLETON PROPORTIONS]]. This could be consistent with:</a:t>
+            </a:r>
+          </a:p>
+          <a:p>
+            <a:pPr marL="228600" indent="-228600">
+              <a:buAutoNum type="arabicParenR"/>
+            </a:pPr>
+            <a:r>
+              <a:rPr lang="en-US" dirty="0"/>
+              <a:t>Many colonies with a (potentially) short foraging range, leading us to incompletely sample the available colonies </a:t>
+            </a:r>
+            <a:r>
+              <a:rPr lang="en-US" dirty="0">
+                <a:sym typeface="Wingdings" pitchFamily="2" charset="2"/>
+              </a:rPr>
+              <a:t> if true, we would expect those sites to also have the highest *abundance* of colonies/workers, which is not consistently the case (although see PM2022 and HR2023?)</a:t>
+            </a:r>
+          </a:p>
+          <a:p>
+            <a:pPr marL="228600" indent="-228600">
+              <a:buAutoNum type="arabicParenR"/>
+            </a:pPr>
+            <a:r>
+              <a:rPr lang="en-US" dirty="0">
+                <a:sym typeface="Wingdings" pitchFamily="2" charset="2"/>
+              </a:rPr>
+              <a:t>Longer foraging distance resulting in a larger *radius* over which colonies are sampled in some landscapes vs others. For example, if average foraging distance is 1km on Westham Island and 2km in ED, we would be effectively sampling 4x the geographic area in ED, which would inflate colony abundance estimates. In this case you would see more singletons not due to incomplete sampling (necessarily) but because foraging kernels are extremely large and siblings are very dispersed in space—meaning that the likelihood of capturing two individuals from a colony is less than in a landscape with smaller, denser </a:t>
+            </a:r>
+            <a:r>
+              <a:rPr lang="en-US">
+                <a:sym typeface="Wingdings" pitchFamily="2" charset="2"/>
+              </a:rPr>
+              <a:t>foraging kernels.</a:t>
+            </a:r>
+            <a:endParaRPr lang="en-US" dirty="0"/>
+          </a:p>
+        </p:txBody>
+      </p:sp>
+      <p:sp>
+        <p:nvSpPr>
+          <p:cNvPr id="4" name="Slide Number Placeholder 3"/>
+          <p:cNvSpPr>
+            <a:spLocks noGrp="1"/>
+          </p:cNvSpPr>
+          <p:nvPr>
+            <p:ph type="sldNum" sz="quarter" idx="5"/>
+          </p:nvPr>
+        </p:nvSpPr>
+        <p:spPr/>
+        <p:txBody>
+          <a:bodyPr/>
+          <a:lstStyle/>
+          <a:p>
+            <a:fld id="{6CDFCB3D-35C4-C549-B975-3D4C63AE4352}" type="slidenum">
+              <a:rPr lang="en-US" smtClean="0"/>
+              <a:t>15</a:t>
+            </a:fld>
+            <a:endParaRPr lang="en-US"/>
+          </a:p>
+        </p:txBody>
+      </p:sp>
+    </p:spTree>
+    <p:extLst>
+      <p:ext uri="{BB962C8B-B14F-4D97-AF65-F5344CB8AC3E}">
+        <p14:creationId xmlns:p14="http://schemas.microsoft.com/office/powerpoint/2010/main" val="3780728009"/>
+      </p:ext>
+    </p:extLst>
+  </p:cSld>
+  <p:clrMapOvr>
+    <a:masterClrMapping/>
+  </p:clrMapOvr>
+</p:notes>
+</file>
+
 <file path=ppt/slideLayouts/slideLayout1.xml><?xml version="1.0" encoding="utf-8"?>
 <p:sldLayout xmlns:a="http://schemas.openxmlformats.org/drawingml/2006/main" xmlns:r="http://schemas.openxmlformats.org/officeDocument/2006/relationships" xmlns:p="http://schemas.openxmlformats.org/presentationml/2006/main" type="title" preserve="1">
   <p:cSld name="Title Slide">
@@ -713,7 +834,7 @@
           <a:p>
             <a:fld id="{1C65382B-6889-7E41-A78D-4A065A4CE39D}" type="datetimeFigureOut">
               <a:rPr lang="en-US" smtClean="0"/>
-              <a:t>10/29/25</a:t>
+              <a:t>11/18/25</a:t>
             </a:fld>
             <a:endParaRPr lang="en-US"/>
           </a:p>
@@ -911,7 +1032,7 @@
           <a:p>
             <a:fld id="{1C65382B-6889-7E41-A78D-4A065A4CE39D}" type="datetimeFigureOut">
               <a:rPr lang="en-US" smtClean="0"/>
-              <a:t>10/29/25</a:t>
+              <a:t>11/18/25</a:t>
             </a:fld>
             <a:endParaRPr lang="en-US"/>
           </a:p>
@@ -1119,7 +1240,7 @@
           <a:p>
             <a:fld id="{1C65382B-6889-7E41-A78D-4A065A4CE39D}" type="datetimeFigureOut">
               <a:rPr lang="en-US" smtClean="0"/>
-              <a:t>10/29/25</a:t>
+              <a:t>11/18/25</a:t>
             </a:fld>
             <a:endParaRPr lang="en-US"/>
           </a:p>
@@ -1317,7 +1438,7 @@
           <a:p>
             <a:fld id="{1C65382B-6889-7E41-A78D-4A065A4CE39D}" type="datetimeFigureOut">
               <a:rPr lang="en-US" smtClean="0"/>
-              <a:t>10/29/25</a:t>
+              <a:t>11/18/25</a:t>
             </a:fld>
             <a:endParaRPr lang="en-US"/>
           </a:p>
@@ -1592,7 +1713,7 @@
           <a:p>
             <a:fld id="{1C65382B-6889-7E41-A78D-4A065A4CE39D}" type="datetimeFigureOut">
               <a:rPr lang="en-US" smtClean="0"/>
-              <a:t>10/29/25</a:t>
+              <a:t>11/18/25</a:t>
             </a:fld>
             <a:endParaRPr lang="en-US"/>
           </a:p>
@@ -1857,7 +1978,7 @@
           <a:p>
             <a:fld id="{1C65382B-6889-7E41-A78D-4A065A4CE39D}" type="datetimeFigureOut">
               <a:rPr lang="en-US" smtClean="0"/>
-              <a:t>10/29/25</a:t>
+              <a:t>11/18/25</a:t>
             </a:fld>
             <a:endParaRPr lang="en-US"/>
           </a:p>
@@ -2269,7 +2390,7 @@
           <a:p>
             <a:fld id="{1C65382B-6889-7E41-A78D-4A065A4CE39D}" type="datetimeFigureOut">
               <a:rPr lang="en-US" smtClean="0"/>
-              <a:t>10/29/25</a:t>
+              <a:t>11/18/25</a:t>
             </a:fld>
             <a:endParaRPr lang="en-US"/>
           </a:p>
@@ -2410,7 +2531,7 @@
           <a:p>
             <a:fld id="{1C65382B-6889-7E41-A78D-4A065A4CE39D}" type="datetimeFigureOut">
               <a:rPr lang="en-US" smtClean="0"/>
-              <a:t>10/29/25</a:t>
+              <a:t>11/18/25</a:t>
             </a:fld>
             <a:endParaRPr lang="en-US"/>
           </a:p>
@@ -2523,7 +2644,7 @@
           <a:p>
             <a:fld id="{1C65382B-6889-7E41-A78D-4A065A4CE39D}" type="datetimeFigureOut">
               <a:rPr lang="en-US" smtClean="0"/>
-              <a:t>10/29/25</a:t>
+              <a:t>11/18/25</a:t>
             </a:fld>
             <a:endParaRPr lang="en-US"/>
           </a:p>
@@ -2834,7 +2955,7 @@
           <a:p>
             <a:fld id="{1C65382B-6889-7E41-A78D-4A065A4CE39D}" type="datetimeFigureOut">
               <a:rPr lang="en-US" smtClean="0"/>
-              <a:t>10/29/25</a:t>
+              <a:t>11/18/25</a:t>
             </a:fld>
             <a:endParaRPr lang="en-US"/>
           </a:p>
@@ -3122,7 +3243,7 @@
           <a:p>
             <a:fld id="{1C65382B-6889-7E41-A78D-4A065A4CE39D}" type="datetimeFigureOut">
               <a:rPr lang="en-US" smtClean="0"/>
-              <a:t>10/29/25</a:t>
+              <a:t>11/18/25</a:t>
             </a:fld>
             <a:endParaRPr lang="en-US"/>
           </a:p>
@@ -3363,7 +3484,7 @@
           <a:p>
             <a:fld id="{1C65382B-6889-7E41-A78D-4A065A4CE39D}" type="datetimeFigureOut">
               <a:rPr lang="en-US" smtClean="0"/>
-              <a:t>10/29/25</a:t>
+              <a:t>11/18/25</a:t>
             </a:fld>
             <a:endParaRPr lang="en-US"/>
           </a:p>
@@ -5241,6 +5362,486 @@
           <p:cNvPr id="2" name="Title 1">
             <a:extLst>
               <a:ext uri="{FF2B5EF4-FFF2-40B4-BE49-F238E27FC236}">
+                <a16:creationId xmlns:a16="http://schemas.microsoft.com/office/drawing/2014/main" id="{3EFDFE6F-EB00-A22C-CE4F-17D3CDD1277B}"/>
+              </a:ext>
+            </a:extLst>
+          </p:cNvPr>
+          <p:cNvSpPr>
+            <a:spLocks noGrp="1"/>
+          </p:cNvSpPr>
+          <p:nvPr>
+            <p:ph type="title"/>
+          </p:nvPr>
+        </p:nvSpPr>
+        <p:spPr>
+          <a:xfrm>
+            <a:off x="838200" y="-24623"/>
+            <a:ext cx="10515600" cy="1325563"/>
+          </a:xfrm>
+        </p:spPr>
+        <p:txBody>
+          <a:bodyPr/>
+          <a:lstStyle/>
+          <a:p>
+            <a:r>
+              <a:rPr lang="en-US" dirty="0"/>
+              <a:t>Estimate colony abundance – site level</a:t>
+            </a:r>
+          </a:p>
+        </p:txBody>
+      </p:sp>
+      <p:pic>
+        <p:nvPicPr>
+          <p:cNvPr id="9" name="Picture 8" descr="A graph showing the number of colonies&#10;&#10;AI-generated content may be incorrect.">
+            <a:extLst>
+              <a:ext uri="{FF2B5EF4-FFF2-40B4-BE49-F238E27FC236}">
+                <a16:creationId xmlns:a16="http://schemas.microsoft.com/office/drawing/2014/main" id="{61244CD7-B0E1-84A4-97CA-EF4A4D148EA4}"/>
+              </a:ext>
+            </a:extLst>
+          </p:cNvPr>
+          <p:cNvPicPr>
+            <a:picLocks noChangeAspect="1"/>
+          </p:cNvPicPr>
+          <p:nvPr/>
+        </p:nvPicPr>
+        <p:blipFill>
+          <a:blip r:embed="rId3"/>
+          <a:stretch>
+            <a:fillRect/>
+          </a:stretch>
+        </p:blipFill>
+        <p:spPr>
+          <a:xfrm>
+            <a:off x="288812" y="1607653"/>
+            <a:ext cx="4470225" cy="2235113"/>
+          </a:xfrm>
+          <a:prstGeom prst="rect">
+            <a:avLst/>
+          </a:prstGeom>
+        </p:spPr>
+      </p:pic>
+      <p:pic>
+        <p:nvPicPr>
+          <p:cNvPr id="13" name="Picture 12" descr="A diagram of a number of colonies&#10;&#10;AI-generated content may be incorrect.">
+            <a:extLst>
+              <a:ext uri="{FF2B5EF4-FFF2-40B4-BE49-F238E27FC236}">
+                <a16:creationId xmlns:a16="http://schemas.microsoft.com/office/drawing/2014/main" id="{55FED433-B9E2-4D57-8391-718AF209A073}"/>
+              </a:ext>
+            </a:extLst>
+          </p:cNvPr>
+          <p:cNvPicPr>
+            <a:picLocks noChangeAspect="1"/>
+          </p:cNvPicPr>
+          <p:nvPr/>
+        </p:nvPicPr>
+        <p:blipFill>
+          <a:blip r:embed="rId4"/>
+          <a:stretch>
+            <a:fillRect/>
+          </a:stretch>
+        </p:blipFill>
+        <p:spPr>
+          <a:xfrm>
+            <a:off x="288813" y="4456191"/>
+            <a:ext cx="4470225" cy="2235113"/>
+          </a:xfrm>
+          <a:prstGeom prst="rect">
+            <a:avLst/>
+          </a:prstGeom>
+        </p:spPr>
+      </p:pic>
+      <p:sp>
+        <p:nvSpPr>
+          <p:cNvPr id="14" name="TextBox 13">
+            <a:extLst>
+              <a:ext uri="{FF2B5EF4-FFF2-40B4-BE49-F238E27FC236}">
+                <a16:creationId xmlns:a16="http://schemas.microsoft.com/office/drawing/2014/main" id="{A878B9EE-58CA-8A86-B4A0-322A7A20EEF6}"/>
+              </a:ext>
+            </a:extLst>
+          </p:cNvPr>
+          <p:cNvSpPr txBox="1"/>
+          <p:nvPr/>
+        </p:nvSpPr>
+        <p:spPr>
+          <a:xfrm>
+            <a:off x="5248950" y="1290688"/>
+            <a:ext cx="1380506" cy="369332"/>
+          </a:xfrm>
+          <a:prstGeom prst="rect">
+            <a:avLst/>
+          </a:prstGeom>
+          <a:noFill/>
+        </p:spPr>
+        <p:txBody>
+          <a:bodyPr wrap="none" rtlCol="0">
+            <a:spAutoFit/>
+          </a:bodyPr>
+          <a:lstStyle/>
+          <a:p>
+            <a:r>
+              <a:rPr lang="en-US" dirty="0" err="1"/>
+              <a:t>Mixtus</a:t>
+            </a:r>
+            <a:r>
+              <a:rPr lang="en-US" dirty="0"/>
+              <a:t> 2022</a:t>
+            </a:r>
+          </a:p>
+        </p:txBody>
+      </p:sp>
+      <p:sp>
+        <p:nvSpPr>
+          <p:cNvPr id="15" name="TextBox 14">
+            <a:extLst>
+              <a:ext uri="{FF2B5EF4-FFF2-40B4-BE49-F238E27FC236}">
+                <a16:creationId xmlns:a16="http://schemas.microsoft.com/office/drawing/2014/main" id="{D64D5061-A269-694F-B24A-D6BD2D95F7C7}"/>
+              </a:ext>
+            </a:extLst>
+          </p:cNvPr>
+          <p:cNvSpPr txBox="1"/>
+          <p:nvPr/>
+        </p:nvSpPr>
+        <p:spPr>
+          <a:xfrm>
+            <a:off x="5206417" y="4456191"/>
+            <a:ext cx="1380506" cy="369332"/>
+          </a:xfrm>
+          <a:prstGeom prst="rect">
+            <a:avLst/>
+          </a:prstGeom>
+          <a:noFill/>
+        </p:spPr>
+        <p:txBody>
+          <a:bodyPr wrap="none" rtlCol="0">
+            <a:spAutoFit/>
+          </a:bodyPr>
+          <a:lstStyle/>
+          <a:p>
+            <a:r>
+              <a:rPr lang="en-US" dirty="0" err="1"/>
+              <a:t>Mixtus</a:t>
+            </a:r>
+            <a:r>
+              <a:rPr lang="en-US" dirty="0"/>
+              <a:t> 2023</a:t>
+            </a:r>
+          </a:p>
+        </p:txBody>
+      </p:sp>
+      <p:sp>
+        <p:nvSpPr>
+          <p:cNvPr id="16" name="TextBox 15">
+            <a:extLst>
+              <a:ext uri="{FF2B5EF4-FFF2-40B4-BE49-F238E27FC236}">
+                <a16:creationId xmlns:a16="http://schemas.microsoft.com/office/drawing/2014/main" id="{7FBC0F1C-FD3E-DE91-E476-35FA60BC816C}"/>
+              </a:ext>
+            </a:extLst>
+          </p:cNvPr>
+          <p:cNvSpPr txBox="1"/>
+          <p:nvPr/>
+        </p:nvSpPr>
+        <p:spPr>
+          <a:xfrm>
+            <a:off x="838200" y="1020751"/>
+            <a:ext cx="3500574" cy="369332"/>
+          </a:xfrm>
+          <a:prstGeom prst="rect">
+            <a:avLst/>
+          </a:prstGeom>
+          <a:noFill/>
+        </p:spPr>
+        <p:txBody>
+          <a:bodyPr wrap="none" rtlCol="0">
+            <a:spAutoFit/>
+          </a:bodyPr>
+          <a:lstStyle/>
+          <a:p>
+            <a:r>
+              <a:rPr lang="en-US" dirty="0"/>
+              <a:t>Fit to truncated negative binomial</a:t>
+            </a:r>
+          </a:p>
+        </p:txBody>
+      </p:sp>
+      <p:pic>
+        <p:nvPicPr>
+          <p:cNvPr id="18" name="Picture 17" descr="A graph showing the number of colonies&#10;&#10;AI-generated content may be incorrect.">
+            <a:extLst>
+              <a:ext uri="{FF2B5EF4-FFF2-40B4-BE49-F238E27FC236}">
+                <a16:creationId xmlns:a16="http://schemas.microsoft.com/office/drawing/2014/main" id="{D81F05CD-DBEC-DF91-854D-D83C2E0F4A8D}"/>
+              </a:ext>
+            </a:extLst>
+          </p:cNvPr>
+          <p:cNvPicPr>
+            <a:picLocks noChangeAspect="1"/>
+          </p:cNvPicPr>
+          <p:nvPr/>
+        </p:nvPicPr>
+        <p:blipFill>
+          <a:blip r:embed="rId5"/>
+          <a:stretch>
+            <a:fillRect/>
+          </a:stretch>
+        </p:blipFill>
+        <p:spPr>
+          <a:xfrm>
+            <a:off x="6749338" y="1287720"/>
+            <a:ext cx="5110092" cy="2555046"/>
+          </a:xfrm>
+          <a:prstGeom prst="rect">
+            <a:avLst/>
+          </a:prstGeom>
+        </p:spPr>
+      </p:pic>
+      <p:pic>
+        <p:nvPicPr>
+          <p:cNvPr id="20" name="Picture 19" descr="A graph of a number of colonies&#10;&#10;AI-generated content may be incorrect.">
+            <a:extLst>
+              <a:ext uri="{FF2B5EF4-FFF2-40B4-BE49-F238E27FC236}">
+                <a16:creationId xmlns:a16="http://schemas.microsoft.com/office/drawing/2014/main" id="{00742F13-D2B1-320A-F8F9-837CE01B6D43}"/>
+              </a:ext>
+            </a:extLst>
+          </p:cNvPr>
+          <p:cNvPicPr>
+            <a:picLocks noChangeAspect="1"/>
+          </p:cNvPicPr>
+          <p:nvPr/>
+        </p:nvPicPr>
+        <p:blipFill>
+          <a:blip r:embed="rId6"/>
+          <a:stretch>
+            <a:fillRect/>
+          </a:stretch>
+        </p:blipFill>
+        <p:spPr>
+          <a:xfrm>
+            <a:off x="6620207" y="4130570"/>
+            <a:ext cx="5281756" cy="2640878"/>
+          </a:xfrm>
+          <a:prstGeom prst="rect">
+            <a:avLst/>
+          </a:prstGeom>
+        </p:spPr>
+      </p:pic>
+      <p:sp>
+        <p:nvSpPr>
+          <p:cNvPr id="21" name="TextBox 20">
+            <a:extLst>
+              <a:ext uri="{FF2B5EF4-FFF2-40B4-BE49-F238E27FC236}">
+                <a16:creationId xmlns:a16="http://schemas.microsoft.com/office/drawing/2014/main" id="{7A0F2A85-94D0-7EF9-986C-3E49F5CBD59C}"/>
+              </a:ext>
+            </a:extLst>
+          </p:cNvPr>
+          <p:cNvSpPr txBox="1"/>
+          <p:nvPr/>
+        </p:nvSpPr>
+        <p:spPr>
+          <a:xfrm>
+            <a:off x="8164751" y="931608"/>
+            <a:ext cx="2536720" cy="369332"/>
+          </a:xfrm>
+          <a:prstGeom prst="rect">
+            <a:avLst/>
+          </a:prstGeom>
+          <a:noFill/>
+        </p:spPr>
+        <p:txBody>
+          <a:bodyPr wrap="none" rtlCol="0">
+            <a:spAutoFit/>
+          </a:bodyPr>
+          <a:lstStyle/>
+          <a:p>
+            <a:r>
+              <a:rPr lang="en-US" dirty="0"/>
+              <a:t>Fit to truncated </a:t>
+            </a:r>
+            <a:r>
+              <a:rPr lang="en-US" dirty="0" err="1"/>
+              <a:t>poisson</a:t>
+            </a:r>
+            <a:endParaRPr lang="en-US" dirty="0"/>
+          </a:p>
+        </p:txBody>
+      </p:sp>
+      <p:sp>
+        <p:nvSpPr>
+          <p:cNvPr id="22" name="TextBox 21">
+            <a:extLst>
+              <a:ext uri="{FF2B5EF4-FFF2-40B4-BE49-F238E27FC236}">
+                <a16:creationId xmlns:a16="http://schemas.microsoft.com/office/drawing/2014/main" id="{5E59FA4E-2FA9-37F2-0887-9E2091FAE524}"/>
+              </a:ext>
+            </a:extLst>
+          </p:cNvPr>
+          <p:cNvSpPr txBox="1"/>
+          <p:nvPr/>
+        </p:nvSpPr>
+        <p:spPr>
+          <a:xfrm>
+            <a:off x="5125209" y="4740123"/>
+            <a:ext cx="1542921" cy="2031325"/>
+          </a:xfrm>
+          <a:prstGeom prst="rect">
+            <a:avLst/>
+          </a:prstGeom>
+          <a:noFill/>
+        </p:spPr>
+        <p:txBody>
+          <a:bodyPr wrap="square" rtlCol="0">
+            <a:spAutoFit/>
+          </a:bodyPr>
+          <a:lstStyle/>
+          <a:p>
+            <a:r>
+              <a:rPr lang="en-US" dirty="0"/>
+              <a:t>Sample sizes:</a:t>
+            </a:r>
+            <a:br>
+              <a:rPr lang="en-US" dirty="0"/>
+            </a:br>
+            <a:r>
+              <a:rPr lang="en-US" dirty="0"/>
+              <a:t>W = 213</a:t>
+            </a:r>
+          </a:p>
+          <a:p>
+            <a:r>
+              <a:rPr lang="en-US" dirty="0"/>
+              <a:t>SD = 83</a:t>
+            </a:r>
+          </a:p>
+          <a:p>
+            <a:r>
+              <a:rPr lang="en-US" dirty="0"/>
+              <a:t>ED = 108</a:t>
+            </a:r>
+          </a:p>
+          <a:p>
+            <a:r>
+              <a:rPr lang="en-US" dirty="0"/>
+              <a:t>NR = 202</a:t>
+            </a:r>
+          </a:p>
+          <a:p>
+            <a:r>
+              <a:rPr lang="en-US" dirty="0"/>
+              <a:t>HR = 293</a:t>
+            </a:r>
+          </a:p>
+          <a:p>
+            <a:r>
+              <a:rPr lang="en-US" dirty="0"/>
+              <a:t>PM = 122</a:t>
+            </a:r>
+          </a:p>
+        </p:txBody>
+      </p:sp>
+      <p:sp>
+        <p:nvSpPr>
+          <p:cNvPr id="23" name="TextBox 22">
+            <a:extLst>
+              <a:ext uri="{FF2B5EF4-FFF2-40B4-BE49-F238E27FC236}">
+                <a16:creationId xmlns:a16="http://schemas.microsoft.com/office/drawing/2014/main" id="{9AECD405-947C-F542-8B08-1AF082111F98}"/>
+              </a:ext>
+            </a:extLst>
+          </p:cNvPr>
+          <p:cNvSpPr txBox="1"/>
+          <p:nvPr/>
+        </p:nvSpPr>
+        <p:spPr>
+          <a:xfrm>
+            <a:off x="5248950" y="1588744"/>
+            <a:ext cx="1542921" cy="2031325"/>
+          </a:xfrm>
+          <a:prstGeom prst="rect">
+            <a:avLst/>
+          </a:prstGeom>
+          <a:noFill/>
+        </p:spPr>
+        <p:txBody>
+          <a:bodyPr wrap="square" rtlCol="0">
+            <a:spAutoFit/>
+          </a:bodyPr>
+          <a:lstStyle/>
+          <a:p>
+            <a:r>
+              <a:rPr lang="en-US" dirty="0"/>
+              <a:t>Sample sizes:</a:t>
+            </a:r>
+            <a:br>
+              <a:rPr lang="en-US" dirty="0"/>
+            </a:br>
+            <a:r>
+              <a:rPr lang="en-US" dirty="0"/>
+              <a:t>W = 138</a:t>
+            </a:r>
+          </a:p>
+          <a:p>
+            <a:r>
+              <a:rPr lang="en-US" dirty="0"/>
+              <a:t>SD =136</a:t>
+            </a:r>
+          </a:p>
+          <a:p>
+            <a:r>
+              <a:rPr lang="en-US" dirty="0"/>
+              <a:t>ED = 98</a:t>
+            </a:r>
+          </a:p>
+          <a:p>
+            <a:r>
+              <a:rPr lang="en-US" dirty="0"/>
+              <a:t>NR = 44</a:t>
+            </a:r>
+          </a:p>
+          <a:p>
+            <a:r>
+              <a:rPr lang="en-US" dirty="0"/>
+              <a:t>HR = 123</a:t>
+            </a:r>
+          </a:p>
+          <a:p>
+            <a:r>
+              <a:rPr lang="en-US" dirty="0"/>
+              <a:t>PM = 165</a:t>
+            </a:r>
+          </a:p>
+        </p:txBody>
+      </p:sp>
+    </p:spTree>
+    <p:extLst>
+      <p:ext uri="{BB962C8B-B14F-4D97-AF65-F5344CB8AC3E}">
+        <p14:creationId xmlns:p14="http://schemas.microsoft.com/office/powerpoint/2010/main" val="1728314244"/>
+      </p:ext>
+    </p:extLst>
+  </p:cSld>
+  <p:clrMapOvr>
+    <a:masterClrMapping/>
+  </p:clrMapOvr>
+</p:sld>
+</file>
+
+<file path=ppt/slides/slide16.xml><?xml version="1.0" encoding="utf-8"?>
+<p:sld xmlns:a="http://schemas.openxmlformats.org/drawingml/2006/main" xmlns:r="http://schemas.openxmlformats.org/officeDocument/2006/relationships" xmlns:p="http://schemas.openxmlformats.org/presentationml/2006/main">
+  <p:cSld>
+    <p:spTree>
+      <p:nvGrpSpPr>
+        <p:cNvPr id="1" name=""/>
+        <p:cNvGrpSpPr/>
+        <p:nvPr/>
+      </p:nvGrpSpPr>
+      <p:grpSpPr>
+        <a:xfrm>
+          <a:off x="0" y="0"/>
+          <a:ext cx="0" cy="0"/>
+          <a:chOff x="0" y="0"/>
+          <a:chExt cx="0" cy="0"/>
+        </a:xfrm>
+      </p:grpSpPr>
+      <p:sp>
+        <p:nvSpPr>
+          <p:cNvPr id="2" name="Title 1">
+            <a:extLst>
+              <a:ext uri="{FF2B5EF4-FFF2-40B4-BE49-F238E27FC236}">
                 <a16:creationId xmlns:a16="http://schemas.microsoft.com/office/drawing/2014/main" id="{E6941D5D-3F5F-C4A0-45DF-4D2002A5DEAB}"/>
               </a:ext>
             </a:extLst>
@@ -5426,7 +6027,7 @@
 </p:sld>
 </file>
 
-<file path=ppt/slides/slide16.xml><?xml version="1.0" encoding="utf-8"?>
+<file path=ppt/slides/slide17.xml><?xml version="1.0" encoding="utf-8"?>
 <p:sld xmlns:a="http://schemas.openxmlformats.org/drawingml/2006/main" xmlns:r="http://schemas.openxmlformats.org/officeDocument/2006/relationships" xmlns:p="http://schemas.openxmlformats.org/presentationml/2006/main">
   <p:cSld>
     <p:spTree>

</xml_diff>

<commit_message>
working on distance weighted landscape metrics
</commit_message>
<xml_diff>
--- a/docs/storyboard.pptx
+++ b/docs/storyboard.pptx
@@ -5,7 +5,7 @@
     <p:sldMasterId id="2147483648" r:id="rId1"/>
   </p:sldMasterIdLst>
   <p:notesMasterIdLst>
-    <p:notesMasterId r:id="rId19"/>
+    <p:notesMasterId r:id="rId20"/>
   </p:notesMasterIdLst>
   <p:sldIdLst>
     <p:sldId id="256" r:id="rId2"/>
@@ -23,8 +23,9 @@
     <p:sldId id="270" r:id="rId14"/>
     <p:sldId id="262" r:id="rId15"/>
     <p:sldId id="272" r:id="rId16"/>
-    <p:sldId id="258" r:id="rId17"/>
-    <p:sldId id="264" r:id="rId18"/>
+    <p:sldId id="273" r:id="rId17"/>
+    <p:sldId id="258" r:id="rId18"/>
+    <p:sldId id="264" r:id="rId19"/>
   </p:sldIdLst>
   <p:sldSz cx="12192000" cy="6858000"/>
   <p:notesSz cx="6858000" cy="9144000"/>
@@ -639,13 +640,7 @@
               <a:rPr lang="en-US" dirty="0">
                 <a:sym typeface="Wingdings" pitchFamily="2" charset="2"/>
               </a:rPr>
-              <a:t>Longer foraging distance resulting in a larger *radius* over which colonies are sampled in some landscapes vs others. For example, if average foraging distance is 1km on Westham Island and 2km in ED, we would be effectively sampling 4x the geographic area in ED, which would inflate colony abundance estimates. In this case you would see more singletons not due to incomplete sampling (necessarily) but because foraging kernels are extremely large and siblings are very dispersed in space—meaning that the likelihood of capturing two individuals from a colony is less than in a landscape with smaller, denser </a:t>
-            </a:r>
-            <a:r>
-              <a:rPr lang="en-US">
-                <a:sym typeface="Wingdings" pitchFamily="2" charset="2"/>
-              </a:rPr>
-              <a:t>foraging kernels.</a:t>
+              <a:t>Longer foraging distance resulting in a larger *radius* over which colonies are sampled in some landscapes vs others. For example, if average foraging distance is 1km on Westham Island and 2km in ED, we would be effectively sampling 4x the geographic area in ED, which would inflate colony abundance estimates. In this case you would see more singletons not due to incomplete sampling (necessarily) but because foraging kernels are extremely large and siblings are very dispersed in space—meaning that the likelihood of capturing two individuals from a colony is less than in a landscape with smaller, denser foraging kernels.</a:t>
             </a:r>
             <a:endParaRPr lang="en-US" dirty="0"/>
           </a:p>
@@ -678,6 +673,125 @@
     <p:extLst>
       <p:ext uri="{BB962C8B-B14F-4D97-AF65-F5344CB8AC3E}">
         <p14:creationId xmlns:p14="http://schemas.microsoft.com/office/powerpoint/2010/main" val="3780728009"/>
+      </p:ext>
+    </p:extLst>
+  </p:cSld>
+  <p:clrMapOvr>
+    <a:masterClrMapping/>
+  </p:clrMapOvr>
+</p:notes>
+</file>
+
+<file path=ppt/notesSlides/notesSlide3.xml><?xml version="1.0" encoding="utf-8"?>
+<p:notes xmlns:a="http://schemas.openxmlformats.org/drawingml/2006/main" xmlns:r="http://schemas.openxmlformats.org/officeDocument/2006/relationships" xmlns:p="http://schemas.openxmlformats.org/presentationml/2006/main">
+  <p:cSld>
+    <p:spTree>
+      <p:nvGrpSpPr>
+        <p:cNvPr id="1" name="">
+          <a:extLst>
+            <a:ext uri="{FF2B5EF4-FFF2-40B4-BE49-F238E27FC236}">
+              <a16:creationId xmlns:a16="http://schemas.microsoft.com/office/drawing/2014/main" id="{D76CDF34-3DB4-A1BB-D7BE-53425B80CD21}"/>
+            </a:ext>
+          </a:extLst>
+        </p:cNvPr>
+        <p:cNvGrpSpPr/>
+        <p:nvPr/>
+      </p:nvGrpSpPr>
+      <p:grpSpPr>
+        <a:xfrm>
+          <a:off x="0" y="0"/>
+          <a:ext cx="0" cy="0"/>
+          <a:chOff x="0" y="0"/>
+          <a:chExt cx="0" cy="0"/>
+        </a:xfrm>
+      </p:grpSpPr>
+      <p:sp>
+        <p:nvSpPr>
+          <p:cNvPr id="2" name="Slide Image Placeholder 1">
+            <a:extLst>
+              <a:ext uri="{FF2B5EF4-FFF2-40B4-BE49-F238E27FC236}">
+                <a16:creationId xmlns:a16="http://schemas.microsoft.com/office/drawing/2014/main" id="{D6108E69-E358-D719-B0C0-9AD7974904C4}"/>
+              </a:ext>
+            </a:extLst>
+          </p:cNvPr>
+          <p:cNvSpPr>
+            <a:spLocks noGrp="1" noRot="1" noChangeAspect="1"/>
+          </p:cNvSpPr>
+          <p:nvPr>
+            <p:ph type="sldImg"/>
+          </p:nvPr>
+        </p:nvSpPr>
+        <p:spPr/>
+      </p:sp>
+      <p:sp>
+        <p:nvSpPr>
+          <p:cNvPr id="3" name="Notes Placeholder 2">
+            <a:extLst>
+              <a:ext uri="{FF2B5EF4-FFF2-40B4-BE49-F238E27FC236}">
+                <a16:creationId xmlns:a16="http://schemas.microsoft.com/office/drawing/2014/main" id="{08D95E4A-D794-2C08-5660-A4ADA1408641}"/>
+              </a:ext>
+            </a:extLst>
+          </p:cNvPr>
+          <p:cNvSpPr>
+            <a:spLocks noGrp="1"/>
+          </p:cNvSpPr>
+          <p:nvPr>
+            <p:ph type="body" idx="1"/>
+          </p:nvPr>
+        </p:nvSpPr>
+        <p:spPr/>
+        <p:txBody>
+          <a:bodyPr/>
+          <a:lstStyle/>
+          <a:p>
+            <a:r>
+              <a:rPr lang="en-US" dirty="0"/>
+              <a:t>Perhaps I should plot lambda/alpha/beta directly, as it seems like (at least in the case of impatiens) those might be similar? E.g., differences in # of predicted colonies align with total abundance…whereas for </a:t>
+            </a:r>
+            <a:r>
+              <a:rPr lang="en-US" dirty="0" err="1"/>
+              <a:t>mixtus</a:t>
+            </a:r>
+            <a:r>
+              <a:rPr lang="en-US" dirty="0"/>
+              <a:t> this is not always the case</a:t>
+            </a:r>
+          </a:p>
+        </p:txBody>
+      </p:sp>
+      <p:sp>
+        <p:nvSpPr>
+          <p:cNvPr id="4" name="Slide Number Placeholder 3">
+            <a:extLst>
+              <a:ext uri="{FF2B5EF4-FFF2-40B4-BE49-F238E27FC236}">
+                <a16:creationId xmlns:a16="http://schemas.microsoft.com/office/drawing/2014/main" id="{9DE96F19-9E0C-32FA-4BD2-7868B866FA7C}"/>
+              </a:ext>
+            </a:extLst>
+          </p:cNvPr>
+          <p:cNvSpPr>
+            <a:spLocks noGrp="1"/>
+          </p:cNvSpPr>
+          <p:nvPr>
+            <p:ph type="sldNum" sz="quarter" idx="5"/>
+          </p:nvPr>
+        </p:nvSpPr>
+        <p:spPr/>
+        <p:txBody>
+          <a:bodyPr/>
+          <a:lstStyle/>
+          <a:p>
+            <a:fld id="{6CDFCB3D-35C4-C549-B975-3D4C63AE4352}" type="slidenum">
+              <a:rPr lang="en-US" smtClean="0"/>
+              <a:t>16</a:t>
+            </a:fld>
+            <a:endParaRPr lang="en-US"/>
+          </a:p>
+        </p:txBody>
+      </p:sp>
+    </p:spTree>
+    <p:extLst>
+      <p:ext uri="{BB962C8B-B14F-4D97-AF65-F5344CB8AC3E}">
+        <p14:creationId xmlns:p14="http://schemas.microsoft.com/office/powerpoint/2010/main" val="1511182502"/>
       </p:ext>
     </p:extLst>
   </p:cSld>
@@ -5376,7 +5490,7 @@
         <p:spPr>
           <a:xfrm>
             <a:off x="838200" y="-24623"/>
-            <a:ext cx="10515600" cy="1325563"/>
+            <a:ext cx="11021230" cy="1325563"/>
           </a:xfrm>
         </p:spPr>
         <p:txBody>
@@ -5385,8 +5499,13 @@
           <a:p>
             <a:r>
               <a:rPr lang="en-US" dirty="0"/>
-              <a:t>Estimate colony abundance – site level</a:t>
-            </a:r>
+              <a:t>Estimate colony abundance – site level, </a:t>
+            </a:r>
+            <a:r>
+              <a:rPr lang="en-US" dirty="0" err="1"/>
+              <a:t>mixtus</a:t>
+            </a:r>
+            <a:endParaRPr lang="en-US" dirty="0"/>
           </a:p>
         </p:txBody>
       </p:sp>
@@ -5825,6 +5944,484 @@
   <p:cSld>
     <p:spTree>
       <p:nvGrpSpPr>
+        <p:cNvPr id="1" name="">
+          <a:extLst>
+            <a:ext uri="{FF2B5EF4-FFF2-40B4-BE49-F238E27FC236}">
+              <a16:creationId xmlns:a16="http://schemas.microsoft.com/office/drawing/2014/main" id="{11290340-F4E7-84F9-0D13-0A0D4F62F50A}"/>
+            </a:ext>
+          </a:extLst>
+        </p:cNvPr>
+        <p:cNvGrpSpPr/>
+        <p:nvPr/>
+      </p:nvGrpSpPr>
+      <p:grpSpPr>
+        <a:xfrm>
+          <a:off x="0" y="0"/>
+          <a:ext cx="0" cy="0"/>
+          <a:chOff x="0" y="0"/>
+          <a:chExt cx="0" cy="0"/>
+        </a:xfrm>
+      </p:grpSpPr>
+      <p:sp>
+        <p:nvSpPr>
+          <p:cNvPr id="2" name="Title 1">
+            <a:extLst>
+              <a:ext uri="{FF2B5EF4-FFF2-40B4-BE49-F238E27FC236}">
+                <a16:creationId xmlns:a16="http://schemas.microsoft.com/office/drawing/2014/main" id="{70FFD030-A0C5-779A-D287-1A361089A5DB}"/>
+              </a:ext>
+            </a:extLst>
+          </p:cNvPr>
+          <p:cNvSpPr>
+            <a:spLocks noGrp="1"/>
+          </p:cNvSpPr>
+          <p:nvPr>
+            <p:ph type="title"/>
+          </p:nvPr>
+        </p:nvSpPr>
+        <p:spPr>
+          <a:xfrm>
+            <a:off x="332570" y="-178908"/>
+            <a:ext cx="11526860" cy="1325563"/>
+          </a:xfrm>
+        </p:spPr>
+        <p:txBody>
+          <a:bodyPr/>
+          <a:lstStyle/>
+          <a:p>
+            <a:r>
+              <a:rPr lang="en-US" dirty="0"/>
+              <a:t>Estimate colony abundance – site level, impatiens</a:t>
+            </a:r>
+          </a:p>
+        </p:txBody>
+      </p:sp>
+      <p:sp>
+        <p:nvSpPr>
+          <p:cNvPr id="15" name="TextBox 14">
+            <a:extLst>
+              <a:ext uri="{FF2B5EF4-FFF2-40B4-BE49-F238E27FC236}">
+                <a16:creationId xmlns:a16="http://schemas.microsoft.com/office/drawing/2014/main" id="{41FFD8AB-0695-63A9-D6CF-80D667CE6011}"/>
+              </a:ext>
+            </a:extLst>
+          </p:cNvPr>
+          <p:cNvSpPr txBox="1"/>
+          <p:nvPr/>
+        </p:nvSpPr>
+        <p:spPr>
+          <a:xfrm>
+            <a:off x="5073580" y="4399133"/>
+            <a:ext cx="1718291" cy="369332"/>
+          </a:xfrm>
+          <a:prstGeom prst="rect">
+            <a:avLst/>
+          </a:prstGeom>
+          <a:noFill/>
+        </p:spPr>
+        <p:txBody>
+          <a:bodyPr wrap="none" rtlCol="0">
+            <a:spAutoFit/>
+          </a:bodyPr>
+          <a:lstStyle/>
+          <a:p>
+            <a:r>
+              <a:rPr lang="en-US" dirty="0"/>
+              <a:t>impatiens 2023</a:t>
+            </a:r>
+          </a:p>
+        </p:txBody>
+      </p:sp>
+      <p:sp>
+        <p:nvSpPr>
+          <p:cNvPr id="16" name="TextBox 15">
+            <a:extLst>
+              <a:ext uri="{FF2B5EF4-FFF2-40B4-BE49-F238E27FC236}">
+                <a16:creationId xmlns:a16="http://schemas.microsoft.com/office/drawing/2014/main" id="{5B2BF0EC-1AA9-39BF-FC96-10E7553137D9}"/>
+              </a:ext>
+            </a:extLst>
+          </p:cNvPr>
+          <p:cNvSpPr txBox="1"/>
+          <p:nvPr/>
+        </p:nvSpPr>
+        <p:spPr>
+          <a:xfrm>
+            <a:off x="838200" y="1020751"/>
+            <a:ext cx="3500574" cy="369332"/>
+          </a:xfrm>
+          <a:prstGeom prst="rect">
+            <a:avLst/>
+          </a:prstGeom>
+          <a:noFill/>
+        </p:spPr>
+        <p:txBody>
+          <a:bodyPr wrap="none" rtlCol="0">
+            <a:spAutoFit/>
+          </a:bodyPr>
+          <a:lstStyle/>
+          <a:p>
+            <a:r>
+              <a:rPr lang="en-US" dirty="0"/>
+              <a:t>Fit to truncated negative binomial</a:t>
+            </a:r>
+          </a:p>
+        </p:txBody>
+      </p:sp>
+      <p:sp>
+        <p:nvSpPr>
+          <p:cNvPr id="21" name="TextBox 20">
+            <a:extLst>
+              <a:ext uri="{FF2B5EF4-FFF2-40B4-BE49-F238E27FC236}">
+                <a16:creationId xmlns:a16="http://schemas.microsoft.com/office/drawing/2014/main" id="{74CCA251-A493-B537-473E-D7C968805B85}"/>
+              </a:ext>
+            </a:extLst>
+          </p:cNvPr>
+          <p:cNvSpPr txBox="1"/>
+          <p:nvPr/>
+        </p:nvSpPr>
+        <p:spPr>
+          <a:xfrm>
+            <a:off x="8164751" y="931608"/>
+            <a:ext cx="2536720" cy="369332"/>
+          </a:xfrm>
+          <a:prstGeom prst="rect">
+            <a:avLst/>
+          </a:prstGeom>
+          <a:noFill/>
+        </p:spPr>
+        <p:txBody>
+          <a:bodyPr wrap="none" rtlCol="0">
+            <a:spAutoFit/>
+          </a:bodyPr>
+          <a:lstStyle/>
+          <a:p>
+            <a:r>
+              <a:rPr lang="en-US" dirty="0"/>
+              <a:t>Fit to truncated </a:t>
+            </a:r>
+            <a:r>
+              <a:rPr lang="en-US" dirty="0" err="1"/>
+              <a:t>poisson</a:t>
+            </a:r>
+            <a:endParaRPr lang="en-US" dirty="0"/>
+          </a:p>
+        </p:txBody>
+      </p:sp>
+      <p:sp>
+        <p:nvSpPr>
+          <p:cNvPr id="22" name="TextBox 21">
+            <a:extLst>
+              <a:ext uri="{FF2B5EF4-FFF2-40B4-BE49-F238E27FC236}">
+                <a16:creationId xmlns:a16="http://schemas.microsoft.com/office/drawing/2014/main" id="{A7164B1C-9BDD-387E-E31E-CEEB790C019E}"/>
+              </a:ext>
+            </a:extLst>
+          </p:cNvPr>
+          <p:cNvSpPr txBox="1"/>
+          <p:nvPr/>
+        </p:nvSpPr>
+        <p:spPr>
+          <a:xfrm>
+            <a:off x="5125209" y="4740123"/>
+            <a:ext cx="1542921" cy="2031325"/>
+          </a:xfrm>
+          <a:prstGeom prst="rect">
+            <a:avLst/>
+          </a:prstGeom>
+          <a:noFill/>
+        </p:spPr>
+        <p:txBody>
+          <a:bodyPr wrap="square" rtlCol="0">
+            <a:spAutoFit/>
+          </a:bodyPr>
+          <a:lstStyle/>
+          <a:p>
+            <a:r>
+              <a:rPr lang="en-US" dirty="0"/>
+              <a:t>Sample sizes:</a:t>
+            </a:r>
+            <a:br>
+              <a:rPr lang="en-US" dirty="0"/>
+            </a:br>
+            <a:r>
+              <a:rPr lang="en-US" dirty="0"/>
+              <a:t>W = 196</a:t>
+            </a:r>
+          </a:p>
+          <a:p>
+            <a:r>
+              <a:rPr lang="en-US" dirty="0"/>
+              <a:t>SD = 228</a:t>
+            </a:r>
+          </a:p>
+          <a:p>
+            <a:r>
+              <a:rPr lang="en-US" dirty="0"/>
+              <a:t>ED = 355</a:t>
+            </a:r>
+          </a:p>
+          <a:p>
+            <a:r>
+              <a:rPr lang="en-US" dirty="0"/>
+              <a:t>NR = 419</a:t>
+            </a:r>
+          </a:p>
+          <a:p>
+            <a:r>
+              <a:rPr lang="en-US" dirty="0"/>
+              <a:t>HR = 293</a:t>
+            </a:r>
+          </a:p>
+          <a:p>
+            <a:r>
+              <a:rPr lang="en-US" dirty="0"/>
+              <a:t>PM = 121</a:t>
+            </a:r>
+          </a:p>
+        </p:txBody>
+      </p:sp>
+      <p:sp>
+        <p:nvSpPr>
+          <p:cNvPr id="23" name="TextBox 22">
+            <a:extLst>
+              <a:ext uri="{FF2B5EF4-FFF2-40B4-BE49-F238E27FC236}">
+                <a16:creationId xmlns:a16="http://schemas.microsoft.com/office/drawing/2014/main" id="{40415F62-CD4E-BF02-F2D9-39D304657D86}"/>
+              </a:ext>
+            </a:extLst>
+          </p:cNvPr>
+          <p:cNvSpPr txBox="1"/>
+          <p:nvPr/>
+        </p:nvSpPr>
+        <p:spPr>
+          <a:xfrm>
+            <a:off x="5248950" y="1588744"/>
+            <a:ext cx="1542921" cy="2031325"/>
+          </a:xfrm>
+          <a:prstGeom prst="rect">
+            <a:avLst/>
+          </a:prstGeom>
+          <a:noFill/>
+        </p:spPr>
+        <p:txBody>
+          <a:bodyPr wrap="square" rtlCol="0">
+            <a:spAutoFit/>
+          </a:bodyPr>
+          <a:lstStyle/>
+          <a:p>
+            <a:r>
+              <a:rPr lang="en-US" dirty="0"/>
+              <a:t>Sample sizes:</a:t>
+            </a:r>
+            <a:br>
+              <a:rPr lang="en-US" dirty="0"/>
+            </a:br>
+            <a:r>
+              <a:rPr lang="en-US" dirty="0"/>
+              <a:t>W = 81</a:t>
+            </a:r>
+          </a:p>
+          <a:p>
+            <a:r>
+              <a:rPr lang="en-US" dirty="0"/>
+              <a:t>SD =188</a:t>
+            </a:r>
+          </a:p>
+          <a:p>
+            <a:r>
+              <a:rPr lang="en-US" dirty="0"/>
+              <a:t>ED = 338</a:t>
+            </a:r>
+          </a:p>
+          <a:p>
+            <a:r>
+              <a:rPr lang="en-US" dirty="0"/>
+              <a:t>NR = 181</a:t>
+            </a:r>
+          </a:p>
+          <a:p>
+            <a:r>
+              <a:rPr lang="en-US" dirty="0"/>
+              <a:t>HR = 153</a:t>
+            </a:r>
+          </a:p>
+          <a:p>
+            <a:r>
+              <a:rPr lang="en-US" dirty="0"/>
+              <a:t>PM = 84</a:t>
+            </a:r>
+          </a:p>
+        </p:txBody>
+      </p:sp>
+      <p:pic>
+        <p:nvPicPr>
+          <p:cNvPr id="4" name="Picture 3" descr="A graph showing the number of colonies&#10;&#10;AI-generated content may be incorrect.">
+            <a:extLst>
+              <a:ext uri="{FF2B5EF4-FFF2-40B4-BE49-F238E27FC236}">
+                <a16:creationId xmlns:a16="http://schemas.microsoft.com/office/drawing/2014/main" id="{86E19F55-EF6E-A1DB-FE07-2E88607A11F8}"/>
+              </a:ext>
+            </a:extLst>
+          </p:cNvPr>
+          <p:cNvPicPr>
+            <a:picLocks noChangeAspect="1"/>
+          </p:cNvPicPr>
+          <p:nvPr/>
+        </p:nvPicPr>
+        <p:blipFill>
+          <a:blip r:embed="rId3"/>
+          <a:stretch>
+            <a:fillRect/>
+          </a:stretch>
+        </p:blipFill>
+        <p:spPr>
+          <a:xfrm>
+            <a:off x="62580" y="1430587"/>
+            <a:ext cx="5186370" cy="2593185"/>
+          </a:xfrm>
+          <a:prstGeom prst="rect">
+            <a:avLst/>
+          </a:prstGeom>
+        </p:spPr>
+      </p:pic>
+      <p:pic>
+        <p:nvPicPr>
+          <p:cNvPr id="6" name="Picture 5" descr="A graph showing the number of colonies&#10;&#10;AI-generated content may be incorrect.">
+            <a:extLst>
+              <a:ext uri="{FF2B5EF4-FFF2-40B4-BE49-F238E27FC236}">
+                <a16:creationId xmlns:a16="http://schemas.microsoft.com/office/drawing/2014/main" id="{ADFFE981-5E26-B316-B90F-E2CDB19FDD7E}"/>
+              </a:ext>
+            </a:extLst>
+          </p:cNvPr>
+          <p:cNvPicPr>
+            <a:picLocks noChangeAspect="1"/>
+          </p:cNvPicPr>
+          <p:nvPr/>
+        </p:nvPicPr>
+        <p:blipFill>
+          <a:blip r:embed="rId4"/>
+          <a:stretch>
+            <a:fillRect/>
+          </a:stretch>
+        </p:blipFill>
+        <p:spPr>
+          <a:xfrm>
+            <a:off x="62579" y="4051465"/>
+            <a:ext cx="5062629" cy="2531315"/>
+          </a:xfrm>
+          <a:prstGeom prst="rect">
+            <a:avLst/>
+          </a:prstGeom>
+        </p:spPr>
+      </p:pic>
+      <p:pic>
+        <p:nvPicPr>
+          <p:cNvPr id="8" name="Picture 7" descr="A graph showing the number of colonies&#10;&#10;AI-generated content may be incorrect.">
+            <a:extLst>
+              <a:ext uri="{FF2B5EF4-FFF2-40B4-BE49-F238E27FC236}">
+                <a16:creationId xmlns:a16="http://schemas.microsoft.com/office/drawing/2014/main" id="{884D9E54-FE81-3B79-B404-592E942F8248}"/>
+              </a:ext>
+            </a:extLst>
+          </p:cNvPr>
+          <p:cNvPicPr>
+            <a:picLocks noChangeAspect="1"/>
+          </p:cNvPicPr>
+          <p:nvPr/>
+        </p:nvPicPr>
+        <p:blipFill>
+          <a:blip r:embed="rId5"/>
+          <a:stretch>
+            <a:fillRect/>
+          </a:stretch>
+        </p:blipFill>
+        <p:spPr>
+          <a:xfrm>
+            <a:off x="6725832" y="1290688"/>
+            <a:ext cx="5466168" cy="2733084"/>
+          </a:xfrm>
+          <a:prstGeom prst="rect">
+            <a:avLst/>
+          </a:prstGeom>
+        </p:spPr>
+      </p:pic>
+      <p:sp>
+        <p:nvSpPr>
+          <p:cNvPr id="14" name="TextBox 13">
+            <a:extLst>
+              <a:ext uri="{FF2B5EF4-FFF2-40B4-BE49-F238E27FC236}">
+                <a16:creationId xmlns:a16="http://schemas.microsoft.com/office/drawing/2014/main" id="{A01B744C-E4B9-98FA-4DB4-53BC5201A791}"/>
+              </a:ext>
+            </a:extLst>
+          </p:cNvPr>
+          <p:cNvSpPr txBox="1"/>
+          <p:nvPr/>
+        </p:nvSpPr>
+        <p:spPr>
+          <a:xfrm>
+            <a:off x="5206416" y="1287090"/>
+            <a:ext cx="1718291" cy="369332"/>
+          </a:xfrm>
+          <a:prstGeom prst="rect">
+            <a:avLst/>
+          </a:prstGeom>
+          <a:noFill/>
+        </p:spPr>
+        <p:txBody>
+          <a:bodyPr wrap="none" rtlCol="0">
+            <a:spAutoFit/>
+          </a:bodyPr>
+          <a:lstStyle/>
+          <a:p>
+            <a:r>
+              <a:rPr lang="en-US" dirty="0"/>
+              <a:t>impatiens 2022</a:t>
+            </a:r>
+          </a:p>
+        </p:txBody>
+      </p:sp>
+      <p:pic>
+        <p:nvPicPr>
+          <p:cNvPr id="11" name="Picture 10" descr="A graph of a number of colonies&#10;&#10;AI-generated content may be incorrect.">
+            <a:extLst>
+              <a:ext uri="{FF2B5EF4-FFF2-40B4-BE49-F238E27FC236}">
+                <a16:creationId xmlns:a16="http://schemas.microsoft.com/office/drawing/2014/main" id="{E4940E91-AE1C-ABD3-996A-020E1DD7275C}"/>
+              </a:ext>
+            </a:extLst>
+          </p:cNvPr>
+          <p:cNvPicPr>
+            <a:picLocks noChangeAspect="1"/>
+          </p:cNvPicPr>
+          <p:nvPr/>
+        </p:nvPicPr>
+        <p:blipFill>
+          <a:blip r:embed="rId6"/>
+          <a:stretch>
+            <a:fillRect/>
+          </a:stretch>
+        </p:blipFill>
+        <p:spPr>
+          <a:xfrm>
+            <a:off x="6725832" y="4023772"/>
+            <a:ext cx="5466168" cy="2733084"/>
+          </a:xfrm>
+          <a:prstGeom prst="rect">
+            <a:avLst/>
+          </a:prstGeom>
+        </p:spPr>
+      </p:pic>
+    </p:spTree>
+    <p:extLst>
+      <p:ext uri="{BB962C8B-B14F-4D97-AF65-F5344CB8AC3E}">
+        <p14:creationId xmlns:p14="http://schemas.microsoft.com/office/powerpoint/2010/main" val="2243197393"/>
+      </p:ext>
+    </p:extLst>
+  </p:cSld>
+  <p:clrMapOvr>
+    <a:masterClrMapping/>
+  </p:clrMapOvr>
+</p:sld>
+</file>
+
+<file path=ppt/slides/slide17.xml><?xml version="1.0" encoding="utf-8"?>
+<p:sld xmlns:a="http://schemas.openxmlformats.org/drawingml/2006/main" xmlns:r="http://schemas.openxmlformats.org/officeDocument/2006/relationships" xmlns:p="http://schemas.openxmlformats.org/presentationml/2006/main">
+  <p:cSld>
+    <p:spTree>
+      <p:nvGrpSpPr>
         <p:cNvPr id="1" name=""/>
         <p:cNvGrpSpPr/>
         <p:nvPr/>
@@ -6027,7 +6624,7 @@
 </p:sld>
 </file>
 
-<file path=ppt/slides/slide17.xml><?xml version="1.0" encoding="utf-8"?>
+<file path=ppt/slides/slide18.xml><?xml version="1.0" encoding="utf-8"?>
 <p:sld xmlns:a="http://schemas.openxmlformats.org/drawingml/2006/main" xmlns:r="http://schemas.openxmlformats.org/officeDocument/2006/relationships" xmlns:p="http://schemas.openxmlformats.org/presentationml/2006/main">
   <p:cSld>
     <p:spTree>

</xml_diff>